<commit_message>
2nd End-to-End Test completed
</commit_message>
<xml_diff>
--- a/docs/auction_step2.pptx
+++ b/docs/auction_step2.pptx
@@ -7,6 +7,7 @@
   <p:sldIdLst>
     <p:sldId id="256" r:id="rId2"/>
     <p:sldId id="259" r:id="rId3"/>
+    <p:sldId id="260" r:id="rId4"/>
   </p:sldIdLst>
   <p:sldSz cx="6858000" cy="9144000" type="screen4x3"/>
   <p:notesSz cx="6802438" cy="9934575"/>
@@ -289,7 +290,7 @@
           <a:p>
             <a:fld id="{250E04CB-C01F-4F60-A519-F98945732554}" type="datetimeFigureOut">
               <a:rPr lang="ko-KR" altLang="en-US" smtClean="0"/>
-              <a:t>2013-10-28</a:t>
+              <a:t>2013-10-29</a:t>
             </a:fld>
             <a:endParaRPr lang="ko-KR" altLang="en-US"/>
           </a:p>
@@ -459,7 +460,7 @@
           <a:p>
             <a:fld id="{250E04CB-C01F-4F60-A519-F98945732554}" type="datetimeFigureOut">
               <a:rPr lang="ko-KR" altLang="en-US" smtClean="0"/>
-              <a:t>2013-10-28</a:t>
+              <a:t>2013-10-29</a:t>
             </a:fld>
             <a:endParaRPr lang="ko-KR" altLang="en-US"/>
           </a:p>
@@ -639,7 +640,7 @@
           <a:p>
             <a:fld id="{250E04CB-C01F-4F60-A519-F98945732554}" type="datetimeFigureOut">
               <a:rPr lang="ko-KR" altLang="en-US" smtClean="0"/>
-              <a:t>2013-10-28</a:t>
+              <a:t>2013-10-29</a:t>
             </a:fld>
             <a:endParaRPr lang="ko-KR" altLang="en-US"/>
           </a:p>
@@ -809,7 +810,7 @@
           <a:p>
             <a:fld id="{250E04CB-C01F-4F60-A519-F98945732554}" type="datetimeFigureOut">
               <a:rPr lang="ko-KR" altLang="en-US" smtClean="0"/>
-              <a:t>2013-10-28</a:t>
+              <a:t>2013-10-29</a:t>
             </a:fld>
             <a:endParaRPr lang="ko-KR" altLang="en-US"/>
           </a:p>
@@ -1055,7 +1056,7 @@
           <a:p>
             <a:fld id="{250E04CB-C01F-4F60-A519-F98945732554}" type="datetimeFigureOut">
               <a:rPr lang="ko-KR" altLang="en-US" smtClean="0"/>
-              <a:t>2013-10-28</a:t>
+              <a:t>2013-10-29</a:t>
             </a:fld>
             <a:endParaRPr lang="ko-KR" altLang="en-US"/>
           </a:p>
@@ -1343,7 +1344,7 @@
           <a:p>
             <a:fld id="{250E04CB-C01F-4F60-A519-F98945732554}" type="datetimeFigureOut">
               <a:rPr lang="ko-KR" altLang="en-US" smtClean="0"/>
-              <a:t>2013-10-28</a:t>
+              <a:t>2013-10-29</a:t>
             </a:fld>
             <a:endParaRPr lang="ko-KR" altLang="en-US"/>
           </a:p>
@@ -1765,7 +1766,7 @@
           <a:p>
             <a:fld id="{250E04CB-C01F-4F60-A519-F98945732554}" type="datetimeFigureOut">
               <a:rPr lang="ko-KR" altLang="en-US" smtClean="0"/>
-              <a:t>2013-10-28</a:t>
+              <a:t>2013-10-29</a:t>
             </a:fld>
             <a:endParaRPr lang="ko-KR" altLang="en-US"/>
           </a:p>
@@ -1883,7 +1884,7 @@
           <a:p>
             <a:fld id="{250E04CB-C01F-4F60-A519-F98945732554}" type="datetimeFigureOut">
               <a:rPr lang="ko-KR" altLang="en-US" smtClean="0"/>
-              <a:t>2013-10-28</a:t>
+              <a:t>2013-10-29</a:t>
             </a:fld>
             <a:endParaRPr lang="ko-KR" altLang="en-US"/>
           </a:p>
@@ -1978,7 +1979,7 @@
           <a:p>
             <a:fld id="{250E04CB-C01F-4F60-A519-F98945732554}" type="datetimeFigureOut">
               <a:rPr lang="ko-KR" altLang="en-US" smtClean="0"/>
-              <a:t>2013-10-28</a:t>
+              <a:t>2013-10-29</a:t>
             </a:fld>
             <a:endParaRPr lang="ko-KR" altLang="en-US"/>
           </a:p>
@@ -2255,7 +2256,7 @@
           <a:p>
             <a:fld id="{250E04CB-C01F-4F60-A519-F98945732554}" type="datetimeFigureOut">
               <a:rPr lang="ko-KR" altLang="en-US" smtClean="0"/>
-              <a:t>2013-10-28</a:t>
+              <a:t>2013-10-29</a:t>
             </a:fld>
             <a:endParaRPr lang="ko-KR" altLang="en-US"/>
           </a:p>
@@ -2508,7 +2509,7 @@
           <a:p>
             <a:fld id="{250E04CB-C01F-4F60-A519-F98945732554}" type="datetimeFigureOut">
               <a:rPr lang="ko-KR" altLang="en-US" smtClean="0"/>
-              <a:t>2013-10-28</a:t>
+              <a:t>2013-10-29</a:t>
             </a:fld>
             <a:endParaRPr lang="ko-KR" altLang="en-US"/>
           </a:p>
@@ -2721,7 +2722,7 @@
           <a:p>
             <a:fld id="{250E04CB-C01F-4F60-A519-F98945732554}" type="datetimeFigureOut">
               <a:rPr lang="ko-KR" altLang="en-US" smtClean="0"/>
-              <a:t>2013-10-28</a:t>
+              <a:t>2013-10-29</a:t>
             </a:fld>
             <a:endParaRPr lang="ko-KR" altLang="en-US"/>
           </a:p>
@@ -3936,7 +3937,7 @@
         </p:nvSpPr>
         <p:spPr>
           <a:xfrm>
-            <a:off x="986641" y="1043608"/>
+            <a:off x="986641" y="1474597"/>
             <a:ext cx="1584176" cy="1224136"/>
           </a:xfrm>
           <a:prstGeom prst="ellipse">
@@ -3996,7 +3997,7 @@
         </p:nvSpPr>
         <p:spPr>
           <a:xfrm>
-            <a:off x="4191595" y="1538484"/>
+            <a:off x="4191595" y="1969473"/>
             <a:ext cx="1355129" cy="450408"/>
           </a:xfrm>
           <a:prstGeom prst="ellipse">
@@ -4054,7 +4055,7 @@
         </p:nvSpPr>
         <p:spPr>
           <a:xfrm>
-            <a:off x="4077072" y="1043608"/>
+            <a:off x="4077072" y="1474597"/>
             <a:ext cx="1584176" cy="1224136"/>
           </a:xfrm>
           <a:prstGeom prst="ellipse">
@@ -4138,7 +4139,7 @@
         </p:nvCxnSpPr>
         <p:spPr>
           <a:xfrm>
-            <a:off x="2570817" y="1655676"/>
+            <a:off x="2570817" y="2086665"/>
             <a:ext cx="786175" cy="0"/>
           </a:xfrm>
           <a:prstGeom prst="line">
@@ -4176,7 +4177,7 @@
         </p:nvCxnSpPr>
         <p:spPr>
           <a:xfrm flipV="1">
-            <a:off x="3364338" y="1655676"/>
+            <a:off x="3364338" y="2086665"/>
             <a:ext cx="712734" cy="839"/>
           </a:xfrm>
           <a:prstGeom prst="line">
@@ -4213,7 +4214,7 @@
         </p:nvSpPr>
         <p:spPr>
           <a:xfrm>
-            <a:off x="482585" y="2483768"/>
+            <a:off x="482585" y="2914757"/>
             <a:ext cx="1584176" cy="1224136"/>
           </a:xfrm>
           <a:prstGeom prst="ellipse">
@@ -4273,7 +4274,7 @@
         </p:nvSpPr>
         <p:spPr>
           <a:xfrm>
-            <a:off x="2636912" y="2484827"/>
+            <a:off x="2636912" y="2915816"/>
             <a:ext cx="1584176" cy="1224136"/>
           </a:xfrm>
           <a:prstGeom prst="ellipse">
@@ -4355,7 +4356,7 @@
         </p:nvCxnSpPr>
         <p:spPr>
           <a:xfrm>
-            <a:off x="2066761" y="3095836"/>
+            <a:off x="2066761" y="3526825"/>
             <a:ext cx="282119" cy="0"/>
           </a:xfrm>
           <a:prstGeom prst="line">
@@ -4393,7 +4394,7 @@
         </p:nvCxnSpPr>
         <p:spPr>
           <a:xfrm flipV="1">
-            <a:off x="2348880" y="3096895"/>
+            <a:off x="2348880" y="3527884"/>
             <a:ext cx="288032" cy="1059"/>
           </a:xfrm>
           <a:prstGeom prst="line">
@@ -4430,7 +4431,7 @@
         </p:nvSpPr>
         <p:spPr>
           <a:xfrm>
-            <a:off x="4797152" y="2471411"/>
+            <a:off x="4797152" y="2902400"/>
             <a:ext cx="1584176" cy="1224136"/>
           </a:xfrm>
           <a:prstGeom prst="ellipse">
@@ -4465,12 +4466,12 @@
           <a:p>
             <a:pPr algn="ctr"/>
             <a:r>
-              <a:rPr lang="en-US" altLang="ko-KR" sz="1200" b="1" dirty="0" smtClean="0">
+              <a:rPr lang="en-US" altLang="ko-KR" sz="1200" b="1" dirty="0" err="1" smtClean="0">
                 <a:solidFill>
                   <a:schemeClr val="tx1"/>
                 </a:solidFill>
               </a:rPr>
-              <a:t>??</a:t>
+              <a:t>MainActivity</a:t>
             </a:r>
             <a:endParaRPr lang="ko-KR" altLang="en-US" sz="1200" b="1" dirty="0">
               <a:solidFill>
@@ -4490,7 +4491,7 @@
         </p:nvCxnSpPr>
         <p:spPr>
           <a:xfrm flipV="1">
-            <a:off x="4221088" y="3094777"/>
+            <a:off x="4221088" y="3525766"/>
             <a:ext cx="288032" cy="2118"/>
           </a:xfrm>
           <a:prstGeom prst="line">
@@ -4528,7 +4529,7 @@
         </p:nvCxnSpPr>
         <p:spPr>
           <a:xfrm flipV="1">
-            <a:off x="4509120" y="3083479"/>
+            <a:off x="4509120" y="3514468"/>
             <a:ext cx="288032" cy="1059"/>
           </a:xfrm>
           <a:prstGeom prst="line">
@@ -4565,7 +4566,7 @@
         </p:nvSpPr>
         <p:spPr>
           <a:xfrm>
-            <a:off x="2924944" y="1188785"/>
+            <a:off x="2924944" y="1619774"/>
             <a:ext cx="771365" cy="430887"/>
           </a:xfrm>
           <a:prstGeom prst="rect">
@@ -4603,7 +4604,7 @@
         </p:nvSpPr>
         <p:spPr>
           <a:xfrm>
-            <a:off x="1963132" y="2590501"/>
+            <a:off x="1963132" y="3021490"/>
             <a:ext cx="771365" cy="430887"/>
           </a:xfrm>
           <a:prstGeom prst="rect">
@@ -4641,7 +4642,7 @@
         </p:nvSpPr>
         <p:spPr>
           <a:xfrm>
-            <a:off x="4190769" y="2628945"/>
+            <a:off x="4190769" y="3059934"/>
             <a:ext cx="678391" cy="430887"/>
           </a:xfrm>
           <a:prstGeom prst="rect">
@@ -4659,6 +4660,1148 @@
             <a:r>
               <a:rPr lang="en-US" altLang="ko-KR" sz="1100" dirty="0" smtClean="0"/>
               <a:t>Event</a:t>
+            </a:r>
+          </a:p>
+          <a:p>
+            <a:pPr algn="ctr"/>
+            <a:r>
+              <a:rPr lang="en-US" altLang="ko-KR" sz="1100" dirty="0" smtClean="0"/>
+              <a:t>Listener</a:t>
+            </a:r>
+            <a:endParaRPr lang="ko-KR" altLang="en-US" sz="1100" dirty="0"/>
+          </a:p>
+        </p:txBody>
+      </p:sp>
+      <p:sp>
+        <p:nvSpPr>
+          <p:cNvPr id="3" name="TextBox 2"/>
+          <p:cNvSpPr txBox="1"/>
+          <p:nvPr/>
+        </p:nvSpPr>
+        <p:spPr>
+          <a:xfrm>
+            <a:off x="283091" y="899592"/>
+            <a:ext cx="4226029" cy="338554"/>
+          </a:xfrm>
+          <a:prstGeom prst="rect">
+            <a:avLst/>
+          </a:prstGeom>
+          <a:noFill/>
+        </p:spPr>
+        <p:txBody>
+          <a:bodyPr wrap="none" rtlCol="0">
+            <a:spAutoFit/>
+          </a:bodyPr>
+          <a:lstStyle/>
+          <a:p>
+            <a:r>
+              <a:rPr lang="en-US" altLang="ko-KR" sz="1600" dirty="0"/>
+              <a:t>Who is responsible for message translator?</a:t>
+            </a:r>
+            <a:endParaRPr lang="ko-KR" altLang="en-US" sz="1600" dirty="0"/>
+          </a:p>
+        </p:txBody>
+      </p:sp>
+      <p:sp>
+        <p:nvSpPr>
+          <p:cNvPr id="23" name="TextBox 22"/>
+          <p:cNvSpPr txBox="1"/>
+          <p:nvPr/>
+        </p:nvSpPr>
+        <p:spPr>
+          <a:xfrm>
+            <a:off x="283091" y="4593486"/>
+            <a:ext cx="3395097" cy="584775"/>
+          </a:xfrm>
+          <a:prstGeom prst="rect">
+            <a:avLst/>
+          </a:prstGeom>
+          <a:noFill/>
+        </p:spPr>
+        <p:txBody>
+          <a:bodyPr wrap="none" rtlCol="0">
+            <a:spAutoFit/>
+          </a:bodyPr>
+          <a:lstStyle/>
+          <a:p>
+            <a:r>
+              <a:rPr lang="en-US" altLang="ko-KR" sz="1600" dirty="0" smtClean="0"/>
+              <a:t>Too many works in </a:t>
+            </a:r>
+            <a:r>
+              <a:rPr lang="en-US" altLang="ko-KR" sz="1600" dirty="0" err="1" smtClean="0"/>
+              <a:t>MainActivity</a:t>
+            </a:r>
+            <a:r>
+              <a:rPr lang="en-US" altLang="ko-KR" sz="1600" dirty="0" smtClean="0"/>
+              <a:t>?</a:t>
+            </a:r>
+          </a:p>
+          <a:p>
+            <a:r>
+              <a:rPr lang="en-US" altLang="ko-KR" sz="1600" dirty="0" smtClean="0"/>
+              <a:t>Event handling vs. Status handling</a:t>
+            </a:r>
+            <a:endParaRPr lang="ko-KR" altLang="en-US" sz="1600" dirty="0"/>
+          </a:p>
+        </p:txBody>
+      </p:sp>
+      <p:sp>
+        <p:nvSpPr>
+          <p:cNvPr id="24" name="타원 23"/>
+          <p:cNvSpPr/>
+          <p:nvPr/>
+        </p:nvSpPr>
+        <p:spPr>
+          <a:xfrm>
+            <a:off x="476672" y="5579053"/>
+            <a:ext cx="1584176" cy="1224136"/>
+          </a:xfrm>
+          <a:prstGeom prst="ellipse">
+            <a:avLst/>
+          </a:prstGeom>
+          <a:solidFill>
+            <a:schemeClr val="bg2"/>
+          </a:solidFill>
+          <a:ln>
+            <a:solidFill>
+              <a:schemeClr val="tx1"/>
+            </a:solidFill>
+          </a:ln>
+        </p:spPr>
+        <p:style>
+          <a:lnRef idx="2">
+            <a:schemeClr val="accent1">
+              <a:shade val="50000"/>
+            </a:schemeClr>
+          </a:lnRef>
+          <a:fillRef idx="1">
+            <a:schemeClr val="accent1"/>
+          </a:fillRef>
+          <a:effectRef idx="0">
+            <a:schemeClr val="accent1"/>
+          </a:effectRef>
+          <a:fontRef idx="minor">
+            <a:schemeClr val="lt1"/>
+          </a:fontRef>
+        </p:style>
+        <p:txBody>
+          <a:bodyPr rtlCol="0" anchor="ctr"/>
+          <a:lstStyle/>
+          <a:p>
+            <a:pPr algn="ctr"/>
+            <a:r>
+              <a:rPr lang="en-US" altLang="ko-KR" sz="1200" b="1" dirty="0" smtClean="0">
+                <a:solidFill>
+                  <a:schemeClr val="tx1"/>
+                </a:solidFill>
+              </a:rPr>
+              <a:t>Message from Auction</a:t>
+            </a:r>
+            <a:endParaRPr lang="ko-KR" altLang="en-US" sz="1200" b="1" dirty="0">
+              <a:solidFill>
+                <a:schemeClr val="tx1"/>
+              </a:solidFill>
+            </a:endParaRPr>
+          </a:p>
+        </p:txBody>
+      </p:sp>
+      <p:sp>
+        <p:nvSpPr>
+          <p:cNvPr id="25" name="타원 24"/>
+          <p:cNvSpPr/>
+          <p:nvPr/>
+        </p:nvSpPr>
+        <p:spPr>
+          <a:xfrm>
+            <a:off x="2630999" y="5580112"/>
+            <a:ext cx="1584176" cy="1224136"/>
+          </a:xfrm>
+          <a:prstGeom prst="ellipse">
+            <a:avLst/>
+          </a:prstGeom>
+          <a:noFill/>
+          <a:ln>
+            <a:solidFill>
+              <a:schemeClr val="tx1"/>
+            </a:solidFill>
+          </a:ln>
+        </p:spPr>
+        <p:style>
+          <a:lnRef idx="2">
+            <a:schemeClr val="accent1">
+              <a:shade val="50000"/>
+            </a:schemeClr>
+          </a:lnRef>
+          <a:fillRef idx="1">
+            <a:schemeClr val="accent1"/>
+          </a:fillRef>
+          <a:effectRef idx="0">
+            <a:schemeClr val="accent1"/>
+          </a:effectRef>
+          <a:fontRef idx="minor">
+            <a:schemeClr val="lt1"/>
+          </a:fontRef>
+        </p:style>
+        <p:txBody>
+          <a:bodyPr rtlCol="0" anchor="ctr"/>
+          <a:lstStyle/>
+          <a:p>
+            <a:pPr algn="ctr"/>
+            <a:r>
+              <a:rPr lang="en-US" altLang="ko-KR" sz="1200" b="1" dirty="0" smtClean="0">
+                <a:solidFill>
+                  <a:schemeClr val="tx1"/>
+                </a:solidFill>
+              </a:rPr>
+              <a:t>Auction</a:t>
+            </a:r>
+          </a:p>
+          <a:p>
+            <a:pPr algn="ctr"/>
+            <a:r>
+              <a:rPr lang="en-US" altLang="ko-KR" sz="1200" b="1" dirty="0" smtClean="0">
+                <a:solidFill>
+                  <a:schemeClr val="tx1"/>
+                </a:solidFill>
+              </a:rPr>
+              <a:t>Message</a:t>
+            </a:r>
+          </a:p>
+          <a:p>
+            <a:pPr algn="ctr"/>
+            <a:r>
+              <a:rPr lang="en-US" altLang="ko-KR" sz="1200" b="1" dirty="0" smtClean="0">
+                <a:solidFill>
+                  <a:schemeClr val="tx1"/>
+                </a:solidFill>
+              </a:rPr>
+              <a:t>Translator</a:t>
+            </a:r>
+            <a:endParaRPr lang="ko-KR" altLang="en-US" sz="1200" b="1" dirty="0">
+              <a:solidFill>
+                <a:schemeClr val="tx1"/>
+              </a:solidFill>
+            </a:endParaRPr>
+          </a:p>
+        </p:txBody>
+      </p:sp>
+      <p:cxnSp>
+        <p:nvCxnSpPr>
+          <p:cNvPr id="26" name="직선 연결선 25"/>
+          <p:cNvCxnSpPr>
+            <a:stCxn id="24" idx="6"/>
+          </p:cNvCxnSpPr>
+          <p:nvPr/>
+        </p:nvCxnSpPr>
+        <p:spPr>
+          <a:xfrm>
+            <a:off x="2060848" y="6191121"/>
+            <a:ext cx="282119" cy="0"/>
+          </a:xfrm>
+          <a:prstGeom prst="line">
+            <a:avLst/>
+          </a:prstGeom>
+          <a:ln w="19050">
+            <a:solidFill>
+              <a:schemeClr val="tx1"/>
+            </a:solidFill>
+            <a:tailEnd type="triangle"/>
+          </a:ln>
+        </p:spPr>
+        <p:style>
+          <a:lnRef idx="1">
+            <a:schemeClr val="accent1"/>
+          </a:lnRef>
+          <a:fillRef idx="0">
+            <a:schemeClr val="accent1"/>
+          </a:fillRef>
+          <a:effectRef idx="0">
+            <a:schemeClr val="accent1"/>
+          </a:effectRef>
+          <a:fontRef idx="minor">
+            <a:schemeClr val="tx1"/>
+          </a:fontRef>
+        </p:style>
+      </p:cxnSp>
+      <p:cxnSp>
+        <p:nvCxnSpPr>
+          <p:cNvPr id="30" name="직선 연결선 29"/>
+          <p:cNvCxnSpPr>
+            <a:endCxn id="25" idx="2"/>
+          </p:cNvCxnSpPr>
+          <p:nvPr/>
+        </p:nvCxnSpPr>
+        <p:spPr>
+          <a:xfrm flipV="1">
+            <a:off x="2342967" y="6192180"/>
+            <a:ext cx="288032" cy="1059"/>
+          </a:xfrm>
+          <a:prstGeom prst="line">
+            <a:avLst/>
+          </a:prstGeom>
+          <a:ln w="19050">
+            <a:solidFill>
+              <a:schemeClr val="tx1"/>
+            </a:solidFill>
+            <a:headEnd type="oval" w="med" len="med"/>
+            <a:tailEnd type="none" w="med" len="med"/>
+          </a:ln>
+        </p:spPr>
+        <p:style>
+          <a:lnRef idx="1">
+            <a:schemeClr val="accent1"/>
+          </a:lnRef>
+          <a:fillRef idx="0">
+            <a:schemeClr val="accent1"/>
+          </a:fillRef>
+          <a:effectRef idx="0">
+            <a:schemeClr val="accent1"/>
+          </a:effectRef>
+          <a:fontRef idx="minor">
+            <a:schemeClr val="tx1"/>
+          </a:fontRef>
+        </p:style>
+      </p:cxnSp>
+      <p:sp>
+        <p:nvSpPr>
+          <p:cNvPr id="33" name="타원 32"/>
+          <p:cNvSpPr/>
+          <p:nvPr/>
+        </p:nvSpPr>
+        <p:spPr>
+          <a:xfrm>
+            <a:off x="4791239" y="5566696"/>
+            <a:ext cx="1584176" cy="1224136"/>
+          </a:xfrm>
+          <a:prstGeom prst="ellipse">
+            <a:avLst/>
+          </a:prstGeom>
+          <a:noFill/>
+          <a:ln>
+            <a:solidFill>
+              <a:schemeClr val="tx1"/>
+            </a:solidFill>
+          </a:ln>
+        </p:spPr>
+        <p:style>
+          <a:lnRef idx="2">
+            <a:schemeClr val="accent1">
+              <a:shade val="50000"/>
+            </a:schemeClr>
+          </a:lnRef>
+          <a:fillRef idx="1">
+            <a:schemeClr val="accent1"/>
+          </a:fillRef>
+          <a:effectRef idx="0">
+            <a:schemeClr val="accent1"/>
+          </a:effectRef>
+          <a:fontRef idx="minor">
+            <a:schemeClr val="lt1"/>
+          </a:fontRef>
+        </p:style>
+        <p:txBody>
+          <a:bodyPr rtlCol="0" anchor="ctr"/>
+          <a:lstStyle/>
+          <a:p>
+            <a:pPr algn="ctr"/>
+            <a:r>
+              <a:rPr lang="en-US" altLang="ko-KR" sz="1200" b="1" dirty="0" err="1" smtClean="0">
+                <a:solidFill>
+                  <a:schemeClr val="tx1"/>
+                </a:solidFill>
+              </a:rPr>
+              <a:t>MainActivity</a:t>
+            </a:r>
+            <a:endParaRPr lang="ko-KR" altLang="en-US" sz="1200" b="1" dirty="0">
+              <a:solidFill>
+                <a:schemeClr val="tx1"/>
+              </a:solidFill>
+            </a:endParaRPr>
+          </a:p>
+        </p:txBody>
+      </p:sp>
+      <p:cxnSp>
+        <p:nvCxnSpPr>
+          <p:cNvPr id="34" name="직선 연결선 33"/>
+          <p:cNvCxnSpPr>
+            <a:stCxn id="25" idx="6"/>
+          </p:cNvCxnSpPr>
+          <p:nvPr/>
+        </p:nvCxnSpPr>
+        <p:spPr>
+          <a:xfrm flipV="1">
+            <a:off x="4215175" y="6190062"/>
+            <a:ext cx="288032" cy="2118"/>
+          </a:xfrm>
+          <a:prstGeom prst="line">
+            <a:avLst/>
+          </a:prstGeom>
+          <a:ln w="19050">
+            <a:solidFill>
+              <a:schemeClr val="tx1"/>
+            </a:solidFill>
+            <a:tailEnd type="triangle"/>
+          </a:ln>
+        </p:spPr>
+        <p:style>
+          <a:lnRef idx="1">
+            <a:schemeClr val="accent1"/>
+          </a:lnRef>
+          <a:fillRef idx="0">
+            <a:schemeClr val="accent1"/>
+          </a:fillRef>
+          <a:effectRef idx="0">
+            <a:schemeClr val="accent1"/>
+          </a:effectRef>
+          <a:fontRef idx="minor">
+            <a:schemeClr val="tx1"/>
+          </a:fontRef>
+        </p:style>
+      </p:cxnSp>
+      <p:cxnSp>
+        <p:nvCxnSpPr>
+          <p:cNvPr id="35" name="직선 연결선 34"/>
+          <p:cNvCxnSpPr>
+            <a:endCxn id="33" idx="2"/>
+          </p:cNvCxnSpPr>
+          <p:nvPr/>
+        </p:nvCxnSpPr>
+        <p:spPr>
+          <a:xfrm flipV="1">
+            <a:off x="4503207" y="6178764"/>
+            <a:ext cx="288032" cy="1059"/>
+          </a:xfrm>
+          <a:prstGeom prst="line">
+            <a:avLst/>
+          </a:prstGeom>
+          <a:ln w="19050">
+            <a:solidFill>
+              <a:schemeClr val="tx1"/>
+            </a:solidFill>
+            <a:headEnd type="oval" w="med" len="med"/>
+            <a:tailEnd type="none" w="med" len="med"/>
+          </a:ln>
+        </p:spPr>
+        <p:style>
+          <a:lnRef idx="1">
+            <a:schemeClr val="accent1"/>
+          </a:lnRef>
+          <a:fillRef idx="0">
+            <a:schemeClr val="accent1"/>
+          </a:fillRef>
+          <a:effectRef idx="0">
+            <a:schemeClr val="accent1"/>
+          </a:effectRef>
+          <a:fontRef idx="minor">
+            <a:schemeClr val="tx1"/>
+          </a:fontRef>
+        </p:style>
+      </p:cxnSp>
+      <p:sp>
+        <p:nvSpPr>
+          <p:cNvPr id="36" name="TextBox 35"/>
+          <p:cNvSpPr txBox="1"/>
+          <p:nvPr/>
+        </p:nvSpPr>
+        <p:spPr>
+          <a:xfrm>
+            <a:off x="1957219" y="5685786"/>
+            <a:ext cx="771365" cy="430887"/>
+          </a:xfrm>
+          <a:prstGeom prst="rect">
+            <a:avLst/>
+          </a:prstGeom>
+          <a:noFill/>
+        </p:spPr>
+        <p:txBody>
+          <a:bodyPr wrap="none" rtlCol="0">
+            <a:spAutoFit/>
+          </a:bodyPr>
+          <a:lstStyle/>
+          <a:p>
+            <a:pPr algn="ctr"/>
+            <a:r>
+              <a:rPr lang="en-US" altLang="ko-KR" sz="1100" dirty="0" smtClean="0"/>
+              <a:t>Message</a:t>
+            </a:r>
+          </a:p>
+          <a:p>
+            <a:pPr algn="ctr"/>
+            <a:r>
+              <a:rPr lang="en-US" altLang="ko-KR" sz="1100" dirty="0" smtClean="0"/>
+              <a:t>Listener</a:t>
+            </a:r>
+            <a:endParaRPr lang="ko-KR" altLang="en-US" sz="1100" dirty="0"/>
+          </a:p>
+        </p:txBody>
+      </p:sp>
+      <p:sp>
+        <p:nvSpPr>
+          <p:cNvPr id="37" name="TextBox 36"/>
+          <p:cNvSpPr txBox="1"/>
+          <p:nvPr/>
+        </p:nvSpPr>
+        <p:spPr>
+          <a:xfrm>
+            <a:off x="4184856" y="5724230"/>
+            <a:ext cx="678391" cy="430887"/>
+          </a:xfrm>
+          <a:prstGeom prst="rect">
+            <a:avLst/>
+          </a:prstGeom>
+          <a:noFill/>
+        </p:spPr>
+        <p:txBody>
+          <a:bodyPr wrap="none" rtlCol="0">
+            <a:spAutoFit/>
+          </a:bodyPr>
+          <a:lstStyle/>
+          <a:p>
+            <a:pPr algn="ctr"/>
+            <a:r>
+              <a:rPr lang="en-US" altLang="ko-KR" sz="1100" dirty="0" smtClean="0"/>
+              <a:t>Event</a:t>
+            </a:r>
+          </a:p>
+          <a:p>
+            <a:pPr algn="ctr"/>
+            <a:r>
+              <a:rPr lang="en-US" altLang="ko-KR" sz="1100" dirty="0" smtClean="0"/>
+              <a:t>Listener</a:t>
+            </a:r>
+            <a:endParaRPr lang="ko-KR" altLang="en-US" sz="1100" dirty="0"/>
+          </a:p>
+        </p:txBody>
+      </p:sp>
+      <p:sp>
+        <p:nvSpPr>
+          <p:cNvPr id="38" name="타원 37"/>
+          <p:cNvSpPr/>
+          <p:nvPr/>
+        </p:nvSpPr>
+        <p:spPr>
+          <a:xfrm>
+            <a:off x="-27384" y="7236296"/>
+            <a:ext cx="1378255" cy="792088"/>
+          </a:xfrm>
+          <a:prstGeom prst="ellipse">
+            <a:avLst/>
+          </a:prstGeom>
+          <a:solidFill>
+            <a:schemeClr val="bg2"/>
+          </a:solidFill>
+          <a:ln>
+            <a:solidFill>
+              <a:schemeClr val="tx1"/>
+            </a:solidFill>
+          </a:ln>
+        </p:spPr>
+        <p:style>
+          <a:lnRef idx="2">
+            <a:schemeClr val="accent1">
+              <a:shade val="50000"/>
+            </a:schemeClr>
+          </a:lnRef>
+          <a:fillRef idx="1">
+            <a:schemeClr val="accent1"/>
+          </a:fillRef>
+          <a:effectRef idx="0">
+            <a:schemeClr val="accent1"/>
+          </a:effectRef>
+          <a:fontRef idx="minor">
+            <a:schemeClr val="lt1"/>
+          </a:fontRef>
+        </p:style>
+        <p:txBody>
+          <a:bodyPr rtlCol="0" anchor="ctr"/>
+          <a:lstStyle/>
+          <a:p>
+            <a:pPr algn="ctr"/>
+            <a:r>
+              <a:rPr lang="en-US" altLang="ko-KR" sz="1200" b="1" dirty="0" smtClean="0">
+                <a:solidFill>
+                  <a:schemeClr val="tx1"/>
+                </a:solidFill>
+              </a:rPr>
+              <a:t>Message from Auction</a:t>
+            </a:r>
+            <a:endParaRPr lang="ko-KR" altLang="en-US" sz="1200" b="1" dirty="0">
+              <a:solidFill>
+                <a:schemeClr val="tx1"/>
+              </a:solidFill>
+            </a:endParaRPr>
+          </a:p>
+        </p:txBody>
+      </p:sp>
+      <p:sp>
+        <p:nvSpPr>
+          <p:cNvPr id="39" name="타원 38"/>
+          <p:cNvSpPr/>
+          <p:nvPr/>
+        </p:nvSpPr>
+        <p:spPr>
+          <a:xfrm>
+            <a:off x="1818416" y="7234178"/>
+            <a:ext cx="1378255" cy="792088"/>
+          </a:xfrm>
+          <a:prstGeom prst="ellipse">
+            <a:avLst/>
+          </a:prstGeom>
+          <a:noFill/>
+          <a:ln>
+            <a:solidFill>
+              <a:schemeClr val="tx1"/>
+            </a:solidFill>
+          </a:ln>
+        </p:spPr>
+        <p:style>
+          <a:lnRef idx="2">
+            <a:schemeClr val="accent1">
+              <a:shade val="50000"/>
+            </a:schemeClr>
+          </a:lnRef>
+          <a:fillRef idx="1">
+            <a:schemeClr val="accent1"/>
+          </a:fillRef>
+          <a:effectRef idx="0">
+            <a:schemeClr val="accent1"/>
+          </a:effectRef>
+          <a:fontRef idx="minor">
+            <a:schemeClr val="lt1"/>
+          </a:fontRef>
+        </p:style>
+        <p:txBody>
+          <a:bodyPr rtlCol="0" anchor="ctr"/>
+          <a:lstStyle/>
+          <a:p>
+            <a:pPr algn="ctr"/>
+            <a:r>
+              <a:rPr lang="en-US" altLang="ko-KR" sz="1200" b="1" dirty="0" smtClean="0">
+                <a:solidFill>
+                  <a:schemeClr val="tx1"/>
+                </a:solidFill>
+              </a:rPr>
+              <a:t>Auction</a:t>
+            </a:r>
+          </a:p>
+          <a:p>
+            <a:pPr algn="ctr"/>
+            <a:r>
+              <a:rPr lang="en-US" altLang="ko-KR" sz="1200" b="1" dirty="0" smtClean="0">
+                <a:solidFill>
+                  <a:schemeClr val="tx1"/>
+                </a:solidFill>
+              </a:rPr>
+              <a:t>Message</a:t>
+            </a:r>
+          </a:p>
+          <a:p>
+            <a:pPr algn="ctr"/>
+            <a:r>
+              <a:rPr lang="en-US" altLang="ko-KR" sz="1200" b="1" dirty="0" smtClean="0">
+                <a:solidFill>
+                  <a:schemeClr val="tx1"/>
+                </a:solidFill>
+              </a:rPr>
+              <a:t>Translator</a:t>
+            </a:r>
+            <a:endParaRPr lang="ko-KR" altLang="en-US" sz="1200" b="1" dirty="0">
+              <a:solidFill>
+                <a:schemeClr val="tx1"/>
+              </a:solidFill>
+            </a:endParaRPr>
+          </a:p>
+        </p:txBody>
+      </p:sp>
+      <p:sp>
+        <p:nvSpPr>
+          <p:cNvPr id="40" name="타원 39"/>
+          <p:cNvSpPr/>
+          <p:nvPr/>
+        </p:nvSpPr>
+        <p:spPr>
+          <a:xfrm>
+            <a:off x="3670063" y="7236296"/>
+            <a:ext cx="1378255" cy="792088"/>
+          </a:xfrm>
+          <a:prstGeom prst="ellipse">
+            <a:avLst/>
+          </a:prstGeom>
+          <a:noFill/>
+          <a:ln>
+            <a:solidFill>
+              <a:schemeClr val="tx1"/>
+            </a:solidFill>
+          </a:ln>
+        </p:spPr>
+        <p:style>
+          <a:lnRef idx="2">
+            <a:schemeClr val="accent1">
+              <a:shade val="50000"/>
+            </a:schemeClr>
+          </a:lnRef>
+          <a:fillRef idx="1">
+            <a:schemeClr val="accent1"/>
+          </a:fillRef>
+          <a:effectRef idx="0">
+            <a:schemeClr val="accent1"/>
+          </a:effectRef>
+          <a:fontRef idx="minor">
+            <a:schemeClr val="lt1"/>
+          </a:fontRef>
+        </p:style>
+        <p:txBody>
+          <a:bodyPr rtlCol="0" anchor="ctr"/>
+          <a:lstStyle/>
+          <a:p>
+            <a:pPr algn="ctr"/>
+            <a:r>
+              <a:rPr lang="en-US" altLang="ko-KR" sz="1200" b="1" dirty="0" smtClean="0">
+                <a:solidFill>
+                  <a:schemeClr val="tx1"/>
+                </a:solidFill>
+              </a:rPr>
+              <a:t>Auction</a:t>
+            </a:r>
+          </a:p>
+          <a:p>
+            <a:pPr algn="ctr"/>
+            <a:r>
+              <a:rPr lang="en-US" altLang="ko-KR" sz="1200" b="1" dirty="0" smtClean="0">
+                <a:solidFill>
+                  <a:schemeClr val="tx1"/>
+                </a:solidFill>
+              </a:rPr>
+              <a:t>Sniper</a:t>
+            </a:r>
+            <a:endParaRPr lang="ko-KR" altLang="en-US" sz="1200" b="1" dirty="0">
+              <a:solidFill>
+                <a:schemeClr val="tx1"/>
+              </a:solidFill>
+            </a:endParaRPr>
+          </a:p>
+        </p:txBody>
+      </p:sp>
+      <p:sp>
+        <p:nvSpPr>
+          <p:cNvPr id="41" name="타원 40"/>
+          <p:cNvSpPr/>
+          <p:nvPr/>
+        </p:nvSpPr>
+        <p:spPr>
+          <a:xfrm>
+            <a:off x="5537904" y="7234178"/>
+            <a:ext cx="1378255" cy="792088"/>
+          </a:xfrm>
+          <a:prstGeom prst="ellipse">
+            <a:avLst/>
+          </a:prstGeom>
+          <a:noFill/>
+          <a:ln>
+            <a:solidFill>
+              <a:schemeClr val="tx1"/>
+            </a:solidFill>
+          </a:ln>
+        </p:spPr>
+        <p:style>
+          <a:lnRef idx="2">
+            <a:schemeClr val="accent1">
+              <a:shade val="50000"/>
+            </a:schemeClr>
+          </a:lnRef>
+          <a:fillRef idx="1">
+            <a:schemeClr val="accent1"/>
+          </a:fillRef>
+          <a:effectRef idx="0">
+            <a:schemeClr val="accent1"/>
+          </a:effectRef>
+          <a:fontRef idx="minor">
+            <a:schemeClr val="lt1"/>
+          </a:fontRef>
+        </p:style>
+        <p:txBody>
+          <a:bodyPr rtlCol="0" anchor="ctr"/>
+          <a:lstStyle/>
+          <a:p>
+            <a:pPr algn="ctr"/>
+            <a:r>
+              <a:rPr lang="en-US" altLang="ko-KR" sz="1200" b="1" dirty="0" smtClean="0">
+                <a:solidFill>
+                  <a:schemeClr val="tx1"/>
+                </a:solidFill>
+              </a:rPr>
+              <a:t>Main</a:t>
+            </a:r>
+          </a:p>
+          <a:p>
+            <a:pPr algn="ctr"/>
+            <a:r>
+              <a:rPr lang="en-US" altLang="ko-KR" sz="1200" b="1" dirty="0" smtClean="0">
+                <a:solidFill>
+                  <a:schemeClr val="tx1"/>
+                </a:solidFill>
+              </a:rPr>
+              <a:t>Activity</a:t>
+            </a:r>
+            <a:endParaRPr lang="ko-KR" altLang="en-US" sz="1200" b="1" dirty="0">
+              <a:solidFill>
+                <a:schemeClr val="tx1"/>
+              </a:solidFill>
+            </a:endParaRPr>
+          </a:p>
+        </p:txBody>
+      </p:sp>
+      <p:cxnSp>
+        <p:nvCxnSpPr>
+          <p:cNvPr id="42" name="직선 연결선 41"/>
+          <p:cNvCxnSpPr>
+            <a:stCxn id="38" idx="6"/>
+          </p:cNvCxnSpPr>
+          <p:nvPr/>
+        </p:nvCxnSpPr>
+        <p:spPr>
+          <a:xfrm flipV="1">
+            <a:off x="1350871" y="7630222"/>
+            <a:ext cx="271450" cy="2118"/>
+          </a:xfrm>
+          <a:prstGeom prst="line">
+            <a:avLst/>
+          </a:prstGeom>
+          <a:ln w="19050">
+            <a:solidFill>
+              <a:schemeClr val="tx1"/>
+            </a:solidFill>
+            <a:tailEnd type="triangle"/>
+          </a:ln>
+        </p:spPr>
+        <p:style>
+          <a:lnRef idx="1">
+            <a:schemeClr val="accent1"/>
+          </a:lnRef>
+          <a:fillRef idx="0">
+            <a:schemeClr val="accent1"/>
+          </a:fillRef>
+          <a:effectRef idx="0">
+            <a:schemeClr val="accent1"/>
+          </a:effectRef>
+          <a:fontRef idx="minor">
+            <a:schemeClr val="tx1"/>
+          </a:fontRef>
+        </p:style>
+      </p:cxnSp>
+      <p:cxnSp>
+        <p:nvCxnSpPr>
+          <p:cNvPr id="43" name="직선 연결선 42"/>
+          <p:cNvCxnSpPr>
+            <a:stCxn id="38" idx="6"/>
+            <a:endCxn id="39" idx="2"/>
+          </p:cNvCxnSpPr>
+          <p:nvPr/>
+        </p:nvCxnSpPr>
+        <p:spPr>
+          <a:xfrm flipV="1">
+            <a:off x="1350871" y="7630222"/>
+            <a:ext cx="467545" cy="2118"/>
+          </a:xfrm>
+          <a:prstGeom prst="line">
+            <a:avLst/>
+          </a:prstGeom>
+          <a:ln w="19050">
+            <a:solidFill>
+              <a:schemeClr val="tx1"/>
+            </a:solidFill>
+            <a:headEnd type="oval" w="med" len="med"/>
+            <a:tailEnd type="none" w="med" len="med"/>
+          </a:ln>
+        </p:spPr>
+        <p:style>
+          <a:lnRef idx="1">
+            <a:schemeClr val="accent1"/>
+          </a:lnRef>
+          <a:fillRef idx="0">
+            <a:schemeClr val="accent1"/>
+          </a:fillRef>
+          <a:effectRef idx="0">
+            <a:schemeClr val="accent1"/>
+          </a:effectRef>
+          <a:fontRef idx="minor">
+            <a:schemeClr val="tx1"/>
+          </a:fontRef>
+        </p:style>
+      </p:cxnSp>
+      <p:sp>
+        <p:nvSpPr>
+          <p:cNvPr id="44" name="TextBox 43"/>
+          <p:cNvSpPr txBox="1"/>
+          <p:nvPr/>
+        </p:nvSpPr>
+        <p:spPr>
+          <a:xfrm>
+            <a:off x="1198960" y="7128864"/>
+            <a:ext cx="771365" cy="430887"/>
+          </a:xfrm>
+          <a:prstGeom prst="rect">
+            <a:avLst/>
+          </a:prstGeom>
+          <a:noFill/>
+        </p:spPr>
+        <p:txBody>
+          <a:bodyPr wrap="none" rtlCol="0">
+            <a:spAutoFit/>
+          </a:bodyPr>
+          <a:lstStyle/>
+          <a:p>
+            <a:pPr algn="ctr"/>
+            <a:r>
+              <a:rPr lang="en-US" altLang="ko-KR" sz="1100" dirty="0" smtClean="0"/>
+              <a:t>Message</a:t>
+            </a:r>
+          </a:p>
+          <a:p>
+            <a:pPr algn="ctr"/>
+            <a:r>
+              <a:rPr lang="en-US" altLang="ko-KR" sz="1100" dirty="0" smtClean="0"/>
+              <a:t>Listener</a:t>
+            </a:r>
+            <a:endParaRPr lang="ko-KR" altLang="en-US" sz="1100" dirty="0"/>
+          </a:p>
+        </p:txBody>
+      </p:sp>
+      <p:cxnSp>
+        <p:nvCxnSpPr>
+          <p:cNvPr id="45" name="직선 연결선 44"/>
+          <p:cNvCxnSpPr>
+            <a:stCxn id="39" idx="6"/>
+          </p:cNvCxnSpPr>
+          <p:nvPr/>
+        </p:nvCxnSpPr>
+        <p:spPr>
+          <a:xfrm>
+            <a:off x="3196671" y="7630222"/>
+            <a:ext cx="284122" cy="4127"/>
+          </a:xfrm>
+          <a:prstGeom prst="line">
+            <a:avLst/>
+          </a:prstGeom>
+          <a:ln w="19050">
+            <a:solidFill>
+              <a:schemeClr val="tx1"/>
+            </a:solidFill>
+            <a:tailEnd type="triangle"/>
+          </a:ln>
+        </p:spPr>
+        <p:style>
+          <a:lnRef idx="1">
+            <a:schemeClr val="accent1"/>
+          </a:lnRef>
+          <a:fillRef idx="0">
+            <a:schemeClr val="accent1"/>
+          </a:fillRef>
+          <a:effectRef idx="0">
+            <a:schemeClr val="accent1"/>
+          </a:effectRef>
+          <a:fontRef idx="minor">
+            <a:schemeClr val="tx1"/>
+          </a:fontRef>
+        </p:style>
+      </p:cxnSp>
+      <p:cxnSp>
+        <p:nvCxnSpPr>
+          <p:cNvPr id="46" name="직선 연결선 45"/>
+          <p:cNvCxnSpPr>
+            <a:stCxn id="39" idx="6"/>
+            <a:endCxn id="40" idx="2"/>
+          </p:cNvCxnSpPr>
+          <p:nvPr/>
+        </p:nvCxnSpPr>
+        <p:spPr>
+          <a:xfrm>
+            <a:off x="3196671" y="7630222"/>
+            <a:ext cx="473392" cy="2118"/>
+          </a:xfrm>
+          <a:prstGeom prst="line">
+            <a:avLst/>
+          </a:prstGeom>
+          <a:ln w="19050">
+            <a:solidFill>
+              <a:schemeClr val="tx1"/>
+            </a:solidFill>
+            <a:headEnd type="oval" w="med" len="med"/>
+            <a:tailEnd type="none" w="med" len="med"/>
+          </a:ln>
+        </p:spPr>
+        <p:style>
+          <a:lnRef idx="1">
+            <a:schemeClr val="accent1"/>
+          </a:lnRef>
+          <a:fillRef idx="0">
+            <a:schemeClr val="accent1"/>
+          </a:fillRef>
+          <a:effectRef idx="0">
+            <a:schemeClr val="accent1"/>
+          </a:effectRef>
+          <a:fontRef idx="minor">
+            <a:schemeClr val="tx1"/>
+          </a:fontRef>
+        </p:style>
+      </p:cxnSp>
+      <p:sp>
+        <p:nvSpPr>
+          <p:cNvPr id="47" name="TextBox 46"/>
+          <p:cNvSpPr txBox="1"/>
+          <p:nvPr/>
+        </p:nvSpPr>
+        <p:spPr>
+          <a:xfrm>
+            <a:off x="3043323" y="6948264"/>
+            <a:ext cx="745717" cy="600164"/>
+          </a:xfrm>
+          <a:prstGeom prst="rect">
+            <a:avLst/>
+          </a:prstGeom>
+          <a:noFill/>
+        </p:spPr>
+        <p:txBody>
+          <a:bodyPr wrap="none" rtlCol="0">
+            <a:spAutoFit/>
+          </a:bodyPr>
+          <a:lstStyle/>
+          <a:p>
+            <a:pPr algn="ctr"/>
+            <a:r>
+              <a:rPr lang="en-US" altLang="ko-KR" sz="1100" dirty="0" smtClean="0"/>
+              <a:t>Auction</a:t>
+            </a:r>
+          </a:p>
+          <a:p>
+            <a:pPr algn="ctr"/>
+            <a:r>
+              <a:rPr lang="en-US" altLang="ko-KR" sz="1100" dirty="0" smtClean="0"/>
+              <a:t>Message</a:t>
+            </a:r>
+          </a:p>
+          <a:p>
+            <a:pPr algn="ctr"/>
+            <a:r>
+              <a:rPr lang="en-US" altLang="ko-KR" sz="1100" dirty="0" smtClean="0"/>
+              <a:t>Listener</a:t>
+            </a:r>
+            <a:endParaRPr lang="ko-KR" altLang="en-US" sz="1100" dirty="0"/>
+          </a:p>
+        </p:txBody>
+      </p:sp>
+      <p:cxnSp>
+        <p:nvCxnSpPr>
+          <p:cNvPr id="48" name="직선 연결선 47"/>
+          <p:cNvCxnSpPr>
+            <a:stCxn id="40" idx="6"/>
+          </p:cNvCxnSpPr>
+          <p:nvPr/>
+        </p:nvCxnSpPr>
+        <p:spPr>
+          <a:xfrm>
+            <a:off x="5048318" y="7632340"/>
+            <a:ext cx="300316" cy="6136"/>
+          </a:xfrm>
+          <a:prstGeom prst="line">
+            <a:avLst/>
+          </a:prstGeom>
+          <a:ln w="19050">
+            <a:solidFill>
+              <a:schemeClr val="tx1"/>
+            </a:solidFill>
+            <a:tailEnd type="triangle"/>
+          </a:ln>
+        </p:spPr>
+        <p:style>
+          <a:lnRef idx="1">
+            <a:schemeClr val="accent1"/>
+          </a:lnRef>
+          <a:fillRef idx="0">
+            <a:schemeClr val="accent1"/>
+          </a:fillRef>
+          <a:effectRef idx="0">
+            <a:schemeClr val="accent1"/>
+          </a:effectRef>
+          <a:fontRef idx="minor">
+            <a:schemeClr val="tx1"/>
+          </a:fontRef>
+        </p:style>
+      </p:cxnSp>
+      <p:cxnSp>
+        <p:nvCxnSpPr>
+          <p:cNvPr id="49" name="직선 연결선 48"/>
+          <p:cNvCxnSpPr>
+            <a:stCxn id="40" idx="6"/>
+            <a:endCxn id="41" idx="2"/>
+          </p:cNvCxnSpPr>
+          <p:nvPr/>
+        </p:nvCxnSpPr>
+        <p:spPr>
+          <a:xfrm flipV="1">
+            <a:off x="5048318" y="7630222"/>
+            <a:ext cx="489586" cy="2118"/>
+          </a:xfrm>
+          <a:prstGeom prst="line">
+            <a:avLst/>
+          </a:prstGeom>
+          <a:ln w="19050">
+            <a:solidFill>
+              <a:schemeClr val="tx1"/>
+            </a:solidFill>
+            <a:headEnd type="oval" w="med" len="med"/>
+            <a:tailEnd type="none" w="med" len="med"/>
+          </a:ln>
+        </p:spPr>
+        <p:style>
+          <a:lnRef idx="1">
+            <a:schemeClr val="accent1"/>
+          </a:lnRef>
+          <a:fillRef idx="0">
+            <a:schemeClr val="accent1"/>
+          </a:fillRef>
+          <a:effectRef idx="0">
+            <a:schemeClr val="accent1"/>
+          </a:effectRef>
+          <a:fontRef idx="minor">
+            <a:schemeClr val="tx1"/>
+          </a:fontRef>
+        </p:style>
+      </p:cxnSp>
+      <p:sp>
+        <p:nvSpPr>
+          <p:cNvPr id="51" name="TextBox 50"/>
+          <p:cNvSpPr txBox="1"/>
+          <p:nvPr/>
+        </p:nvSpPr>
+        <p:spPr>
+          <a:xfrm>
+            <a:off x="4941168" y="6996172"/>
+            <a:ext cx="678391" cy="600164"/>
+          </a:xfrm>
+          <a:prstGeom prst="rect">
+            <a:avLst/>
+          </a:prstGeom>
+          <a:noFill/>
+        </p:spPr>
+        <p:txBody>
+          <a:bodyPr wrap="none" rtlCol="0">
+            <a:spAutoFit/>
+          </a:bodyPr>
+          <a:lstStyle/>
+          <a:p>
+            <a:pPr algn="ctr"/>
+            <a:r>
+              <a:rPr lang="en-US" altLang="ko-KR" sz="1100" dirty="0" smtClean="0"/>
+              <a:t>Sniper</a:t>
+            </a:r>
+          </a:p>
+          <a:p>
+            <a:pPr algn="ctr"/>
+            <a:r>
+              <a:rPr lang="en-US" altLang="ko-KR" sz="1100" dirty="0" smtClean="0"/>
+              <a:t>Status</a:t>
             </a:r>
           </a:p>
           <a:p>
@@ -4675,6 +5818,1543 @@
     <p:extLst>
       <p:ext uri="{BB962C8B-B14F-4D97-AF65-F5344CB8AC3E}">
         <p14:creationId xmlns:p14="http://schemas.microsoft.com/office/powerpoint/2010/main" val="3572590029"/>
+      </p:ext>
+    </p:extLst>
+  </p:cSld>
+  <p:clrMapOvr>
+    <a:masterClrMapping/>
+  </p:clrMapOvr>
+  <p:timing>
+    <p:tnLst>
+      <p:par>
+        <p:cTn id="1" dur="indefinite" restart="never" nodeType="tmRoot"/>
+      </p:par>
+    </p:tnLst>
+  </p:timing>
+</p:sld>
+</file>
+
+<file path=ppt/slides/slide3.xml><?xml version="1.0" encoding="utf-8"?>
+<p:sld xmlns:a="http://schemas.openxmlformats.org/drawingml/2006/main" xmlns:r="http://schemas.openxmlformats.org/officeDocument/2006/relationships" xmlns:p="http://schemas.openxmlformats.org/presentationml/2006/main">
+  <p:cSld>
+    <p:spTree>
+      <p:nvGrpSpPr>
+        <p:cNvPr id="1" name=""/>
+        <p:cNvGrpSpPr/>
+        <p:nvPr/>
+      </p:nvGrpSpPr>
+      <p:grpSpPr>
+        <a:xfrm>
+          <a:off x="0" y="0"/>
+          <a:ext cx="0" cy="0"/>
+          <a:chOff x="0" y="0"/>
+          <a:chExt cx="0" cy="0"/>
+        </a:xfrm>
+      </p:grpSpPr>
+      <p:sp>
+        <p:nvSpPr>
+          <p:cNvPr id="5" name="TextBox 4"/>
+          <p:cNvSpPr txBox="1"/>
+          <p:nvPr/>
+        </p:nvSpPr>
+        <p:spPr>
+          <a:xfrm>
+            <a:off x="188640" y="323528"/>
+            <a:ext cx="2462662" cy="369332"/>
+          </a:xfrm>
+          <a:prstGeom prst="rect">
+            <a:avLst/>
+          </a:prstGeom>
+          <a:noFill/>
+        </p:spPr>
+        <p:txBody>
+          <a:bodyPr wrap="none" rtlCol="0">
+            <a:spAutoFit/>
+          </a:bodyPr>
+          <a:lstStyle/>
+          <a:p>
+            <a:r>
+              <a:rPr lang="en-US" altLang="ko-KR" b="1" dirty="0" smtClean="0"/>
+              <a:t>Single Responsibility</a:t>
+            </a:r>
+            <a:endParaRPr lang="ko-KR" altLang="en-US" b="1" dirty="0"/>
+          </a:p>
+        </p:txBody>
+      </p:sp>
+      <p:sp>
+        <p:nvSpPr>
+          <p:cNvPr id="6" name="TextBox 5"/>
+          <p:cNvSpPr txBox="1"/>
+          <p:nvPr/>
+        </p:nvSpPr>
+        <p:spPr>
+          <a:xfrm>
+            <a:off x="283091" y="1106905"/>
+            <a:ext cx="5936177" cy="338554"/>
+          </a:xfrm>
+          <a:prstGeom prst="rect">
+            <a:avLst/>
+          </a:prstGeom>
+          <a:noFill/>
+        </p:spPr>
+        <p:txBody>
+          <a:bodyPr wrap="none" rtlCol="0">
+            <a:spAutoFit/>
+          </a:bodyPr>
+          <a:lstStyle/>
+          <a:p>
+            <a:r>
+              <a:rPr lang="en-US" altLang="ko-KR" sz="1600" dirty="0" smtClean="0"/>
+              <a:t>Is it proper that </a:t>
+            </a:r>
+            <a:r>
+              <a:rPr lang="en-US" altLang="ko-KR" sz="1600" dirty="0" err="1" smtClean="0"/>
+              <a:t>AuctionSniper</a:t>
+            </a:r>
+            <a:r>
+              <a:rPr lang="en-US" altLang="ko-KR" sz="1600" dirty="0" smtClean="0"/>
+              <a:t> has network related methods?</a:t>
+            </a:r>
+            <a:endParaRPr lang="ko-KR" altLang="en-US" sz="1600" dirty="0"/>
+          </a:p>
+        </p:txBody>
+      </p:sp>
+      <p:sp>
+        <p:nvSpPr>
+          <p:cNvPr id="7" name="타원 6"/>
+          <p:cNvSpPr/>
+          <p:nvPr/>
+        </p:nvSpPr>
+        <p:spPr>
+          <a:xfrm>
+            <a:off x="-58159" y="1835696"/>
+            <a:ext cx="1378255" cy="792088"/>
+          </a:xfrm>
+          <a:prstGeom prst="ellipse">
+            <a:avLst/>
+          </a:prstGeom>
+          <a:solidFill>
+            <a:schemeClr val="bg2"/>
+          </a:solidFill>
+          <a:ln>
+            <a:solidFill>
+              <a:schemeClr val="tx1"/>
+            </a:solidFill>
+          </a:ln>
+        </p:spPr>
+        <p:style>
+          <a:lnRef idx="2">
+            <a:schemeClr val="accent1">
+              <a:shade val="50000"/>
+            </a:schemeClr>
+          </a:lnRef>
+          <a:fillRef idx="1">
+            <a:schemeClr val="accent1"/>
+          </a:fillRef>
+          <a:effectRef idx="0">
+            <a:schemeClr val="accent1"/>
+          </a:effectRef>
+          <a:fontRef idx="minor">
+            <a:schemeClr val="lt1"/>
+          </a:fontRef>
+        </p:style>
+        <p:txBody>
+          <a:bodyPr rtlCol="0" anchor="ctr"/>
+          <a:lstStyle/>
+          <a:p>
+            <a:pPr algn="ctr"/>
+            <a:r>
+              <a:rPr lang="en-US" altLang="ko-KR" sz="1200" b="1" dirty="0" smtClean="0">
+                <a:solidFill>
+                  <a:schemeClr val="tx1"/>
+                </a:solidFill>
+              </a:rPr>
+              <a:t>Message from Auction</a:t>
+            </a:r>
+            <a:endParaRPr lang="ko-KR" altLang="en-US" sz="1200" b="1" dirty="0">
+              <a:solidFill>
+                <a:schemeClr val="tx1"/>
+              </a:solidFill>
+            </a:endParaRPr>
+          </a:p>
+        </p:txBody>
+      </p:sp>
+      <p:sp>
+        <p:nvSpPr>
+          <p:cNvPr id="8" name="타원 7"/>
+          <p:cNvSpPr/>
+          <p:nvPr/>
+        </p:nvSpPr>
+        <p:spPr>
+          <a:xfrm>
+            <a:off x="1787641" y="1833578"/>
+            <a:ext cx="1378255" cy="792088"/>
+          </a:xfrm>
+          <a:prstGeom prst="ellipse">
+            <a:avLst/>
+          </a:prstGeom>
+          <a:noFill/>
+          <a:ln>
+            <a:solidFill>
+              <a:schemeClr val="tx1"/>
+            </a:solidFill>
+          </a:ln>
+        </p:spPr>
+        <p:style>
+          <a:lnRef idx="2">
+            <a:schemeClr val="accent1">
+              <a:shade val="50000"/>
+            </a:schemeClr>
+          </a:lnRef>
+          <a:fillRef idx="1">
+            <a:schemeClr val="accent1"/>
+          </a:fillRef>
+          <a:effectRef idx="0">
+            <a:schemeClr val="accent1"/>
+          </a:effectRef>
+          <a:fontRef idx="minor">
+            <a:schemeClr val="lt1"/>
+          </a:fontRef>
+        </p:style>
+        <p:txBody>
+          <a:bodyPr rtlCol="0" anchor="ctr"/>
+          <a:lstStyle/>
+          <a:p>
+            <a:pPr algn="ctr"/>
+            <a:r>
+              <a:rPr lang="en-US" altLang="ko-KR" sz="1200" b="1" dirty="0" smtClean="0">
+                <a:solidFill>
+                  <a:schemeClr val="tx1"/>
+                </a:solidFill>
+              </a:rPr>
+              <a:t>Auction</a:t>
+            </a:r>
+          </a:p>
+          <a:p>
+            <a:pPr algn="ctr"/>
+            <a:r>
+              <a:rPr lang="en-US" altLang="ko-KR" sz="1200" b="1" dirty="0" smtClean="0">
+                <a:solidFill>
+                  <a:schemeClr val="tx1"/>
+                </a:solidFill>
+              </a:rPr>
+              <a:t>Message</a:t>
+            </a:r>
+          </a:p>
+          <a:p>
+            <a:pPr algn="ctr"/>
+            <a:r>
+              <a:rPr lang="en-US" altLang="ko-KR" sz="1200" b="1" dirty="0" smtClean="0">
+                <a:solidFill>
+                  <a:schemeClr val="tx1"/>
+                </a:solidFill>
+              </a:rPr>
+              <a:t>Translator</a:t>
+            </a:r>
+            <a:endParaRPr lang="ko-KR" altLang="en-US" sz="1200" b="1" dirty="0">
+              <a:solidFill>
+                <a:schemeClr val="tx1"/>
+              </a:solidFill>
+            </a:endParaRPr>
+          </a:p>
+        </p:txBody>
+      </p:sp>
+      <p:sp>
+        <p:nvSpPr>
+          <p:cNvPr id="9" name="타원 8"/>
+          <p:cNvSpPr/>
+          <p:nvPr/>
+        </p:nvSpPr>
+        <p:spPr>
+          <a:xfrm>
+            <a:off x="3639288" y="1835696"/>
+            <a:ext cx="1378255" cy="792088"/>
+          </a:xfrm>
+          <a:prstGeom prst="ellipse">
+            <a:avLst/>
+          </a:prstGeom>
+          <a:noFill/>
+          <a:ln>
+            <a:solidFill>
+              <a:schemeClr val="tx1"/>
+            </a:solidFill>
+          </a:ln>
+        </p:spPr>
+        <p:style>
+          <a:lnRef idx="2">
+            <a:schemeClr val="accent1">
+              <a:shade val="50000"/>
+            </a:schemeClr>
+          </a:lnRef>
+          <a:fillRef idx="1">
+            <a:schemeClr val="accent1"/>
+          </a:fillRef>
+          <a:effectRef idx="0">
+            <a:schemeClr val="accent1"/>
+          </a:effectRef>
+          <a:fontRef idx="minor">
+            <a:schemeClr val="lt1"/>
+          </a:fontRef>
+        </p:style>
+        <p:txBody>
+          <a:bodyPr rtlCol="0" anchor="ctr"/>
+          <a:lstStyle/>
+          <a:p>
+            <a:pPr algn="ctr"/>
+            <a:r>
+              <a:rPr lang="en-US" altLang="ko-KR" sz="1200" b="1" dirty="0" smtClean="0">
+                <a:solidFill>
+                  <a:schemeClr val="tx1"/>
+                </a:solidFill>
+              </a:rPr>
+              <a:t>Auction</a:t>
+            </a:r>
+          </a:p>
+          <a:p>
+            <a:pPr algn="ctr"/>
+            <a:r>
+              <a:rPr lang="en-US" altLang="ko-KR" sz="1200" b="1" dirty="0" smtClean="0">
+                <a:solidFill>
+                  <a:schemeClr val="tx1"/>
+                </a:solidFill>
+              </a:rPr>
+              <a:t>Sniper</a:t>
+            </a:r>
+            <a:endParaRPr lang="ko-KR" altLang="en-US" sz="1200" b="1" dirty="0">
+              <a:solidFill>
+                <a:schemeClr val="tx1"/>
+              </a:solidFill>
+            </a:endParaRPr>
+          </a:p>
+        </p:txBody>
+      </p:sp>
+      <p:sp>
+        <p:nvSpPr>
+          <p:cNvPr id="10" name="타원 9"/>
+          <p:cNvSpPr/>
+          <p:nvPr/>
+        </p:nvSpPr>
+        <p:spPr>
+          <a:xfrm>
+            <a:off x="5507129" y="1833578"/>
+            <a:ext cx="1378255" cy="792088"/>
+          </a:xfrm>
+          <a:prstGeom prst="ellipse">
+            <a:avLst/>
+          </a:prstGeom>
+          <a:noFill/>
+          <a:ln>
+            <a:solidFill>
+              <a:schemeClr val="tx1"/>
+            </a:solidFill>
+          </a:ln>
+        </p:spPr>
+        <p:style>
+          <a:lnRef idx="2">
+            <a:schemeClr val="accent1">
+              <a:shade val="50000"/>
+            </a:schemeClr>
+          </a:lnRef>
+          <a:fillRef idx="1">
+            <a:schemeClr val="accent1"/>
+          </a:fillRef>
+          <a:effectRef idx="0">
+            <a:schemeClr val="accent1"/>
+          </a:effectRef>
+          <a:fontRef idx="minor">
+            <a:schemeClr val="lt1"/>
+          </a:fontRef>
+        </p:style>
+        <p:txBody>
+          <a:bodyPr rtlCol="0" anchor="ctr"/>
+          <a:lstStyle/>
+          <a:p>
+            <a:pPr algn="ctr"/>
+            <a:r>
+              <a:rPr lang="en-US" altLang="ko-KR" sz="1200" b="1" dirty="0" smtClean="0">
+                <a:solidFill>
+                  <a:schemeClr val="tx1"/>
+                </a:solidFill>
+              </a:rPr>
+              <a:t>Main</a:t>
+            </a:r>
+          </a:p>
+          <a:p>
+            <a:pPr algn="ctr"/>
+            <a:r>
+              <a:rPr lang="en-US" altLang="ko-KR" sz="1200" b="1" dirty="0" smtClean="0">
+                <a:solidFill>
+                  <a:schemeClr val="tx1"/>
+                </a:solidFill>
+              </a:rPr>
+              <a:t>Activity</a:t>
+            </a:r>
+            <a:endParaRPr lang="ko-KR" altLang="en-US" sz="1200" b="1" dirty="0">
+              <a:solidFill>
+                <a:schemeClr val="tx1"/>
+              </a:solidFill>
+            </a:endParaRPr>
+          </a:p>
+        </p:txBody>
+      </p:sp>
+      <p:cxnSp>
+        <p:nvCxnSpPr>
+          <p:cNvPr id="11" name="직선 연결선 10"/>
+          <p:cNvCxnSpPr>
+            <a:stCxn id="7" idx="6"/>
+          </p:cNvCxnSpPr>
+          <p:nvPr/>
+        </p:nvCxnSpPr>
+        <p:spPr>
+          <a:xfrm flipV="1">
+            <a:off x="1320096" y="2229622"/>
+            <a:ext cx="271450" cy="2118"/>
+          </a:xfrm>
+          <a:prstGeom prst="line">
+            <a:avLst/>
+          </a:prstGeom>
+          <a:ln w="19050">
+            <a:solidFill>
+              <a:schemeClr val="tx1"/>
+            </a:solidFill>
+            <a:tailEnd type="triangle"/>
+          </a:ln>
+        </p:spPr>
+        <p:style>
+          <a:lnRef idx="1">
+            <a:schemeClr val="accent1"/>
+          </a:lnRef>
+          <a:fillRef idx="0">
+            <a:schemeClr val="accent1"/>
+          </a:fillRef>
+          <a:effectRef idx="0">
+            <a:schemeClr val="accent1"/>
+          </a:effectRef>
+          <a:fontRef idx="minor">
+            <a:schemeClr val="tx1"/>
+          </a:fontRef>
+        </p:style>
+      </p:cxnSp>
+      <p:cxnSp>
+        <p:nvCxnSpPr>
+          <p:cNvPr id="12" name="직선 연결선 11"/>
+          <p:cNvCxnSpPr>
+            <a:endCxn id="8" idx="2"/>
+          </p:cNvCxnSpPr>
+          <p:nvPr/>
+        </p:nvCxnSpPr>
+        <p:spPr>
+          <a:xfrm flipV="1">
+            <a:off x="1591546" y="2229622"/>
+            <a:ext cx="196095" cy="8254"/>
+          </a:xfrm>
+          <a:prstGeom prst="line">
+            <a:avLst/>
+          </a:prstGeom>
+          <a:ln w="19050">
+            <a:solidFill>
+              <a:schemeClr val="tx1"/>
+            </a:solidFill>
+            <a:headEnd type="oval" w="med" len="med"/>
+            <a:tailEnd type="none" w="med" len="med"/>
+          </a:ln>
+        </p:spPr>
+        <p:style>
+          <a:lnRef idx="1">
+            <a:schemeClr val="accent1"/>
+          </a:lnRef>
+          <a:fillRef idx="0">
+            <a:schemeClr val="accent1"/>
+          </a:fillRef>
+          <a:effectRef idx="0">
+            <a:schemeClr val="accent1"/>
+          </a:effectRef>
+          <a:fontRef idx="minor">
+            <a:schemeClr val="tx1"/>
+          </a:fontRef>
+        </p:style>
+      </p:cxnSp>
+      <p:sp>
+        <p:nvSpPr>
+          <p:cNvPr id="13" name="TextBox 12"/>
+          <p:cNvSpPr txBox="1"/>
+          <p:nvPr/>
+        </p:nvSpPr>
+        <p:spPr>
+          <a:xfrm>
+            <a:off x="1168185" y="1728264"/>
+            <a:ext cx="771365" cy="430887"/>
+          </a:xfrm>
+          <a:prstGeom prst="rect">
+            <a:avLst/>
+          </a:prstGeom>
+          <a:noFill/>
+        </p:spPr>
+        <p:txBody>
+          <a:bodyPr wrap="none" rtlCol="0">
+            <a:spAutoFit/>
+          </a:bodyPr>
+          <a:lstStyle/>
+          <a:p>
+            <a:pPr algn="ctr"/>
+            <a:r>
+              <a:rPr lang="en-US" altLang="ko-KR" sz="1100" dirty="0" smtClean="0"/>
+              <a:t>Message</a:t>
+            </a:r>
+          </a:p>
+          <a:p>
+            <a:pPr algn="ctr"/>
+            <a:r>
+              <a:rPr lang="en-US" altLang="ko-KR" sz="1100" dirty="0" smtClean="0"/>
+              <a:t>Listener</a:t>
+            </a:r>
+            <a:endParaRPr lang="ko-KR" altLang="en-US" sz="1100" dirty="0"/>
+          </a:p>
+        </p:txBody>
+      </p:sp>
+      <p:cxnSp>
+        <p:nvCxnSpPr>
+          <p:cNvPr id="14" name="직선 연결선 13"/>
+          <p:cNvCxnSpPr>
+            <a:stCxn id="8" idx="6"/>
+          </p:cNvCxnSpPr>
+          <p:nvPr/>
+        </p:nvCxnSpPr>
+        <p:spPr>
+          <a:xfrm>
+            <a:off x="3165896" y="2229622"/>
+            <a:ext cx="284122" cy="4127"/>
+          </a:xfrm>
+          <a:prstGeom prst="line">
+            <a:avLst/>
+          </a:prstGeom>
+          <a:ln w="19050">
+            <a:solidFill>
+              <a:schemeClr val="tx1"/>
+            </a:solidFill>
+            <a:tailEnd type="triangle"/>
+          </a:ln>
+        </p:spPr>
+        <p:style>
+          <a:lnRef idx="1">
+            <a:schemeClr val="accent1"/>
+          </a:lnRef>
+          <a:fillRef idx="0">
+            <a:schemeClr val="accent1"/>
+          </a:fillRef>
+          <a:effectRef idx="0">
+            <a:schemeClr val="accent1"/>
+          </a:effectRef>
+          <a:fontRef idx="minor">
+            <a:schemeClr val="tx1"/>
+          </a:fontRef>
+        </p:style>
+      </p:cxnSp>
+      <p:cxnSp>
+        <p:nvCxnSpPr>
+          <p:cNvPr id="15" name="직선 연결선 14"/>
+          <p:cNvCxnSpPr>
+            <a:endCxn id="9" idx="2"/>
+          </p:cNvCxnSpPr>
+          <p:nvPr/>
+        </p:nvCxnSpPr>
+        <p:spPr>
+          <a:xfrm flipV="1">
+            <a:off x="3450018" y="2231740"/>
+            <a:ext cx="189270" cy="6136"/>
+          </a:xfrm>
+          <a:prstGeom prst="line">
+            <a:avLst/>
+          </a:prstGeom>
+          <a:ln w="19050">
+            <a:solidFill>
+              <a:schemeClr val="tx1"/>
+            </a:solidFill>
+            <a:headEnd type="oval" w="med" len="med"/>
+            <a:tailEnd type="none" w="med" len="med"/>
+          </a:ln>
+        </p:spPr>
+        <p:style>
+          <a:lnRef idx="1">
+            <a:schemeClr val="accent1"/>
+          </a:lnRef>
+          <a:fillRef idx="0">
+            <a:schemeClr val="accent1"/>
+          </a:fillRef>
+          <a:effectRef idx="0">
+            <a:schemeClr val="accent1"/>
+          </a:effectRef>
+          <a:fontRef idx="minor">
+            <a:schemeClr val="tx1"/>
+          </a:fontRef>
+        </p:style>
+      </p:cxnSp>
+      <p:sp>
+        <p:nvSpPr>
+          <p:cNvPr id="16" name="TextBox 15"/>
+          <p:cNvSpPr txBox="1"/>
+          <p:nvPr/>
+        </p:nvSpPr>
+        <p:spPr>
+          <a:xfrm>
+            <a:off x="3012548" y="1547664"/>
+            <a:ext cx="745717" cy="600164"/>
+          </a:xfrm>
+          <a:prstGeom prst="rect">
+            <a:avLst/>
+          </a:prstGeom>
+          <a:noFill/>
+        </p:spPr>
+        <p:txBody>
+          <a:bodyPr wrap="none" rtlCol="0">
+            <a:spAutoFit/>
+          </a:bodyPr>
+          <a:lstStyle/>
+          <a:p>
+            <a:pPr algn="ctr"/>
+            <a:r>
+              <a:rPr lang="en-US" altLang="ko-KR" sz="1100" dirty="0" smtClean="0"/>
+              <a:t>Auction</a:t>
+            </a:r>
+          </a:p>
+          <a:p>
+            <a:pPr algn="ctr"/>
+            <a:r>
+              <a:rPr lang="en-US" altLang="ko-KR" sz="1100" dirty="0" smtClean="0"/>
+              <a:t>Message</a:t>
+            </a:r>
+          </a:p>
+          <a:p>
+            <a:pPr algn="ctr"/>
+            <a:r>
+              <a:rPr lang="en-US" altLang="ko-KR" sz="1100" dirty="0" smtClean="0"/>
+              <a:t>Listener</a:t>
+            </a:r>
+            <a:endParaRPr lang="ko-KR" altLang="en-US" sz="1100" dirty="0"/>
+          </a:p>
+        </p:txBody>
+      </p:sp>
+      <p:cxnSp>
+        <p:nvCxnSpPr>
+          <p:cNvPr id="17" name="직선 연결선 16"/>
+          <p:cNvCxnSpPr>
+            <a:stCxn id="9" idx="6"/>
+          </p:cNvCxnSpPr>
+          <p:nvPr/>
+        </p:nvCxnSpPr>
+        <p:spPr>
+          <a:xfrm>
+            <a:off x="5017543" y="2231740"/>
+            <a:ext cx="300316" cy="6136"/>
+          </a:xfrm>
+          <a:prstGeom prst="line">
+            <a:avLst/>
+          </a:prstGeom>
+          <a:ln w="19050">
+            <a:solidFill>
+              <a:schemeClr val="tx1"/>
+            </a:solidFill>
+            <a:tailEnd type="triangle"/>
+          </a:ln>
+        </p:spPr>
+        <p:style>
+          <a:lnRef idx="1">
+            <a:schemeClr val="accent1"/>
+          </a:lnRef>
+          <a:fillRef idx="0">
+            <a:schemeClr val="accent1"/>
+          </a:fillRef>
+          <a:effectRef idx="0">
+            <a:schemeClr val="accent1"/>
+          </a:effectRef>
+          <a:fontRef idx="minor">
+            <a:schemeClr val="tx1"/>
+          </a:fontRef>
+        </p:style>
+      </p:cxnSp>
+      <p:cxnSp>
+        <p:nvCxnSpPr>
+          <p:cNvPr id="18" name="직선 연결선 17"/>
+          <p:cNvCxnSpPr>
+            <a:endCxn id="10" idx="2"/>
+          </p:cNvCxnSpPr>
+          <p:nvPr/>
+        </p:nvCxnSpPr>
+        <p:spPr>
+          <a:xfrm flipV="1">
+            <a:off x="5317859" y="2229622"/>
+            <a:ext cx="189270" cy="8254"/>
+          </a:xfrm>
+          <a:prstGeom prst="line">
+            <a:avLst/>
+          </a:prstGeom>
+          <a:ln w="19050">
+            <a:solidFill>
+              <a:schemeClr val="tx1"/>
+            </a:solidFill>
+            <a:headEnd type="oval" w="med" len="med"/>
+            <a:tailEnd type="none" w="med" len="med"/>
+          </a:ln>
+        </p:spPr>
+        <p:style>
+          <a:lnRef idx="1">
+            <a:schemeClr val="accent1"/>
+          </a:lnRef>
+          <a:fillRef idx="0">
+            <a:schemeClr val="accent1"/>
+          </a:fillRef>
+          <a:effectRef idx="0">
+            <a:schemeClr val="accent1"/>
+          </a:effectRef>
+          <a:fontRef idx="minor">
+            <a:schemeClr val="tx1"/>
+          </a:fontRef>
+        </p:style>
+      </p:cxnSp>
+      <p:sp>
+        <p:nvSpPr>
+          <p:cNvPr id="19" name="TextBox 18"/>
+          <p:cNvSpPr txBox="1"/>
+          <p:nvPr/>
+        </p:nvSpPr>
+        <p:spPr>
+          <a:xfrm>
+            <a:off x="4910393" y="1595572"/>
+            <a:ext cx="678391" cy="600164"/>
+          </a:xfrm>
+          <a:prstGeom prst="rect">
+            <a:avLst/>
+          </a:prstGeom>
+          <a:noFill/>
+        </p:spPr>
+        <p:txBody>
+          <a:bodyPr wrap="none" rtlCol="0">
+            <a:spAutoFit/>
+          </a:bodyPr>
+          <a:lstStyle/>
+          <a:p>
+            <a:pPr algn="ctr"/>
+            <a:r>
+              <a:rPr lang="en-US" altLang="ko-KR" sz="1100" dirty="0" smtClean="0"/>
+              <a:t>Sniper</a:t>
+            </a:r>
+          </a:p>
+          <a:p>
+            <a:pPr algn="ctr"/>
+            <a:r>
+              <a:rPr lang="en-US" altLang="ko-KR" sz="1100" dirty="0" smtClean="0"/>
+              <a:t>Status</a:t>
+            </a:r>
+          </a:p>
+          <a:p>
+            <a:pPr algn="ctr"/>
+            <a:r>
+              <a:rPr lang="en-US" altLang="ko-KR" sz="1100" dirty="0" smtClean="0"/>
+              <a:t>Listener</a:t>
+            </a:r>
+            <a:endParaRPr lang="ko-KR" altLang="en-US" sz="1100" dirty="0"/>
+          </a:p>
+        </p:txBody>
+      </p:sp>
+      <p:sp>
+        <p:nvSpPr>
+          <p:cNvPr id="20" name="타원 19"/>
+          <p:cNvSpPr/>
+          <p:nvPr/>
+        </p:nvSpPr>
+        <p:spPr>
+          <a:xfrm>
+            <a:off x="-58159" y="3131840"/>
+            <a:ext cx="1378255" cy="792088"/>
+          </a:xfrm>
+          <a:prstGeom prst="ellipse">
+            <a:avLst/>
+          </a:prstGeom>
+          <a:solidFill>
+            <a:schemeClr val="bg2"/>
+          </a:solidFill>
+          <a:ln>
+            <a:solidFill>
+              <a:schemeClr val="tx1"/>
+            </a:solidFill>
+          </a:ln>
+        </p:spPr>
+        <p:style>
+          <a:lnRef idx="2">
+            <a:schemeClr val="accent1">
+              <a:shade val="50000"/>
+            </a:schemeClr>
+          </a:lnRef>
+          <a:fillRef idx="1">
+            <a:schemeClr val="accent1"/>
+          </a:fillRef>
+          <a:effectRef idx="0">
+            <a:schemeClr val="accent1"/>
+          </a:effectRef>
+          <a:fontRef idx="minor">
+            <a:schemeClr val="lt1"/>
+          </a:fontRef>
+        </p:style>
+        <p:txBody>
+          <a:bodyPr rtlCol="0" anchor="ctr"/>
+          <a:lstStyle/>
+          <a:p>
+            <a:pPr algn="ctr"/>
+            <a:r>
+              <a:rPr lang="en-US" altLang="ko-KR" sz="1200" b="1" dirty="0" smtClean="0">
+                <a:solidFill>
+                  <a:schemeClr val="tx1"/>
+                </a:solidFill>
+              </a:rPr>
+              <a:t>Message from Auction</a:t>
+            </a:r>
+            <a:endParaRPr lang="ko-KR" altLang="en-US" sz="1200" b="1" dirty="0">
+              <a:solidFill>
+                <a:schemeClr val="tx1"/>
+              </a:solidFill>
+            </a:endParaRPr>
+          </a:p>
+        </p:txBody>
+      </p:sp>
+      <p:sp>
+        <p:nvSpPr>
+          <p:cNvPr id="21" name="타원 20"/>
+          <p:cNvSpPr/>
+          <p:nvPr/>
+        </p:nvSpPr>
+        <p:spPr>
+          <a:xfrm>
+            <a:off x="1787641" y="3129722"/>
+            <a:ext cx="1378255" cy="792088"/>
+          </a:xfrm>
+          <a:prstGeom prst="ellipse">
+            <a:avLst/>
+          </a:prstGeom>
+          <a:noFill/>
+          <a:ln>
+            <a:solidFill>
+              <a:schemeClr val="tx1"/>
+            </a:solidFill>
+          </a:ln>
+        </p:spPr>
+        <p:style>
+          <a:lnRef idx="2">
+            <a:schemeClr val="accent1">
+              <a:shade val="50000"/>
+            </a:schemeClr>
+          </a:lnRef>
+          <a:fillRef idx="1">
+            <a:schemeClr val="accent1"/>
+          </a:fillRef>
+          <a:effectRef idx="0">
+            <a:schemeClr val="accent1"/>
+          </a:effectRef>
+          <a:fontRef idx="minor">
+            <a:schemeClr val="lt1"/>
+          </a:fontRef>
+        </p:style>
+        <p:txBody>
+          <a:bodyPr rtlCol="0" anchor="ctr"/>
+          <a:lstStyle/>
+          <a:p>
+            <a:pPr algn="ctr"/>
+            <a:r>
+              <a:rPr lang="en-US" altLang="ko-KR" sz="1200" b="1" dirty="0" smtClean="0">
+                <a:solidFill>
+                  <a:schemeClr val="tx1"/>
+                </a:solidFill>
+              </a:rPr>
+              <a:t>Auction</a:t>
+            </a:r>
+          </a:p>
+          <a:p>
+            <a:pPr algn="ctr"/>
+            <a:r>
+              <a:rPr lang="en-US" altLang="ko-KR" sz="1200" b="1" dirty="0" smtClean="0">
+                <a:solidFill>
+                  <a:schemeClr val="tx1"/>
+                </a:solidFill>
+              </a:rPr>
+              <a:t>Message</a:t>
+            </a:r>
+          </a:p>
+          <a:p>
+            <a:pPr algn="ctr"/>
+            <a:r>
+              <a:rPr lang="en-US" altLang="ko-KR" sz="1200" b="1" dirty="0" smtClean="0">
+                <a:solidFill>
+                  <a:schemeClr val="tx1"/>
+                </a:solidFill>
+              </a:rPr>
+              <a:t>Translator</a:t>
+            </a:r>
+            <a:endParaRPr lang="ko-KR" altLang="en-US" sz="1200" b="1" dirty="0">
+              <a:solidFill>
+                <a:schemeClr val="tx1"/>
+              </a:solidFill>
+            </a:endParaRPr>
+          </a:p>
+        </p:txBody>
+      </p:sp>
+      <p:sp>
+        <p:nvSpPr>
+          <p:cNvPr id="22" name="타원 21"/>
+          <p:cNvSpPr/>
+          <p:nvPr/>
+        </p:nvSpPr>
+        <p:spPr>
+          <a:xfrm>
+            <a:off x="3639288" y="3131840"/>
+            <a:ext cx="1378255" cy="792088"/>
+          </a:xfrm>
+          <a:prstGeom prst="ellipse">
+            <a:avLst/>
+          </a:prstGeom>
+          <a:noFill/>
+          <a:ln>
+            <a:solidFill>
+              <a:schemeClr val="tx1"/>
+            </a:solidFill>
+          </a:ln>
+        </p:spPr>
+        <p:style>
+          <a:lnRef idx="2">
+            <a:schemeClr val="accent1">
+              <a:shade val="50000"/>
+            </a:schemeClr>
+          </a:lnRef>
+          <a:fillRef idx="1">
+            <a:schemeClr val="accent1"/>
+          </a:fillRef>
+          <a:effectRef idx="0">
+            <a:schemeClr val="accent1"/>
+          </a:effectRef>
+          <a:fontRef idx="minor">
+            <a:schemeClr val="lt1"/>
+          </a:fontRef>
+        </p:style>
+        <p:txBody>
+          <a:bodyPr rtlCol="0" anchor="ctr"/>
+          <a:lstStyle/>
+          <a:p>
+            <a:pPr algn="ctr"/>
+            <a:r>
+              <a:rPr lang="en-US" altLang="ko-KR" sz="1200" b="1" dirty="0" smtClean="0">
+                <a:solidFill>
+                  <a:schemeClr val="tx1"/>
+                </a:solidFill>
+              </a:rPr>
+              <a:t>Auction</a:t>
+            </a:r>
+          </a:p>
+          <a:p>
+            <a:pPr algn="ctr"/>
+            <a:r>
+              <a:rPr lang="en-US" altLang="ko-KR" sz="1200" b="1" dirty="0" smtClean="0">
+                <a:solidFill>
+                  <a:schemeClr val="tx1"/>
+                </a:solidFill>
+              </a:rPr>
+              <a:t>Sniper</a:t>
+            </a:r>
+            <a:endParaRPr lang="ko-KR" altLang="en-US" sz="1200" b="1" dirty="0">
+              <a:solidFill>
+                <a:schemeClr val="tx1"/>
+              </a:solidFill>
+            </a:endParaRPr>
+          </a:p>
+        </p:txBody>
+      </p:sp>
+      <p:sp>
+        <p:nvSpPr>
+          <p:cNvPr id="23" name="타원 22"/>
+          <p:cNvSpPr/>
+          <p:nvPr/>
+        </p:nvSpPr>
+        <p:spPr>
+          <a:xfrm>
+            <a:off x="5507129" y="3129722"/>
+            <a:ext cx="1378255" cy="792088"/>
+          </a:xfrm>
+          <a:prstGeom prst="ellipse">
+            <a:avLst/>
+          </a:prstGeom>
+          <a:noFill/>
+          <a:ln>
+            <a:solidFill>
+              <a:schemeClr val="tx1"/>
+            </a:solidFill>
+          </a:ln>
+        </p:spPr>
+        <p:style>
+          <a:lnRef idx="2">
+            <a:schemeClr val="accent1">
+              <a:shade val="50000"/>
+            </a:schemeClr>
+          </a:lnRef>
+          <a:fillRef idx="1">
+            <a:schemeClr val="accent1"/>
+          </a:fillRef>
+          <a:effectRef idx="0">
+            <a:schemeClr val="accent1"/>
+          </a:effectRef>
+          <a:fontRef idx="minor">
+            <a:schemeClr val="lt1"/>
+          </a:fontRef>
+        </p:style>
+        <p:txBody>
+          <a:bodyPr rtlCol="0" anchor="ctr"/>
+          <a:lstStyle/>
+          <a:p>
+            <a:pPr algn="ctr"/>
+            <a:r>
+              <a:rPr lang="en-US" altLang="ko-KR" sz="1200" b="1" dirty="0" smtClean="0">
+                <a:solidFill>
+                  <a:schemeClr val="tx1"/>
+                </a:solidFill>
+              </a:rPr>
+              <a:t>Main</a:t>
+            </a:r>
+          </a:p>
+          <a:p>
+            <a:pPr algn="ctr"/>
+            <a:r>
+              <a:rPr lang="en-US" altLang="ko-KR" sz="1200" b="1" dirty="0" smtClean="0">
+                <a:solidFill>
+                  <a:schemeClr val="tx1"/>
+                </a:solidFill>
+              </a:rPr>
+              <a:t>Activity</a:t>
+            </a:r>
+            <a:endParaRPr lang="ko-KR" altLang="en-US" sz="1200" b="1" dirty="0">
+              <a:solidFill>
+                <a:schemeClr val="tx1"/>
+              </a:solidFill>
+            </a:endParaRPr>
+          </a:p>
+        </p:txBody>
+      </p:sp>
+      <p:cxnSp>
+        <p:nvCxnSpPr>
+          <p:cNvPr id="24" name="직선 연결선 23"/>
+          <p:cNvCxnSpPr>
+            <a:stCxn id="20" idx="6"/>
+          </p:cNvCxnSpPr>
+          <p:nvPr/>
+        </p:nvCxnSpPr>
+        <p:spPr>
+          <a:xfrm flipV="1">
+            <a:off x="1320096" y="3525766"/>
+            <a:ext cx="271450" cy="2118"/>
+          </a:xfrm>
+          <a:prstGeom prst="line">
+            <a:avLst/>
+          </a:prstGeom>
+          <a:ln w="19050">
+            <a:solidFill>
+              <a:schemeClr val="tx1"/>
+            </a:solidFill>
+            <a:tailEnd type="triangle"/>
+          </a:ln>
+        </p:spPr>
+        <p:style>
+          <a:lnRef idx="1">
+            <a:schemeClr val="accent1"/>
+          </a:lnRef>
+          <a:fillRef idx="0">
+            <a:schemeClr val="accent1"/>
+          </a:fillRef>
+          <a:effectRef idx="0">
+            <a:schemeClr val="accent1"/>
+          </a:effectRef>
+          <a:fontRef idx="minor">
+            <a:schemeClr val="tx1"/>
+          </a:fontRef>
+        </p:style>
+      </p:cxnSp>
+      <p:cxnSp>
+        <p:nvCxnSpPr>
+          <p:cNvPr id="25" name="직선 연결선 24"/>
+          <p:cNvCxnSpPr>
+            <a:endCxn id="21" idx="2"/>
+          </p:cNvCxnSpPr>
+          <p:nvPr/>
+        </p:nvCxnSpPr>
+        <p:spPr>
+          <a:xfrm flipV="1">
+            <a:off x="1600200" y="3525766"/>
+            <a:ext cx="187441" cy="4834"/>
+          </a:xfrm>
+          <a:prstGeom prst="line">
+            <a:avLst/>
+          </a:prstGeom>
+          <a:ln w="19050">
+            <a:solidFill>
+              <a:schemeClr val="tx1"/>
+            </a:solidFill>
+            <a:headEnd type="oval" w="med" len="med"/>
+            <a:tailEnd type="none" w="med" len="med"/>
+          </a:ln>
+        </p:spPr>
+        <p:style>
+          <a:lnRef idx="1">
+            <a:schemeClr val="accent1"/>
+          </a:lnRef>
+          <a:fillRef idx="0">
+            <a:schemeClr val="accent1"/>
+          </a:fillRef>
+          <a:effectRef idx="0">
+            <a:schemeClr val="accent1"/>
+          </a:effectRef>
+          <a:fontRef idx="minor">
+            <a:schemeClr val="tx1"/>
+          </a:fontRef>
+        </p:style>
+      </p:cxnSp>
+      <p:sp>
+        <p:nvSpPr>
+          <p:cNvPr id="26" name="TextBox 25"/>
+          <p:cNvSpPr txBox="1"/>
+          <p:nvPr/>
+        </p:nvSpPr>
+        <p:spPr>
+          <a:xfrm>
+            <a:off x="1168185" y="3024408"/>
+            <a:ext cx="771365" cy="430887"/>
+          </a:xfrm>
+          <a:prstGeom prst="rect">
+            <a:avLst/>
+          </a:prstGeom>
+          <a:noFill/>
+        </p:spPr>
+        <p:txBody>
+          <a:bodyPr wrap="none" rtlCol="0">
+            <a:spAutoFit/>
+          </a:bodyPr>
+          <a:lstStyle/>
+          <a:p>
+            <a:pPr algn="ctr"/>
+            <a:r>
+              <a:rPr lang="en-US" altLang="ko-KR" sz="1100" dirty="0" smtClean="0"/>
+              <a:t>Message</a:t>
+            </a:r>
+          </a:p>
+          <a:p>
+            <a:pPr algn="ctr"/>
+            <a:r>
+              <a:rPr lang="en-US" altLang="ko-KR" sz="1100" dirty="0" smtClean="0"/>
+              <a:t>Listener</a:t>
+            </a:r>
+            <a:endParaRPr lang="ko-KR" altLang="en-US" sz="1100" dirty="0"/>
+          </a:p>
+        </p:txBody>
+      </p:sp>
+      <p:cxnSp>
+        <p:nvCxnSpPr>
+          <p:cNvPr id="27" name="직선 연결선 26"/>
+          <p:cNvCxnSpPr>
+            <a:stCxn id="21" idx="6"/>
+          </p:cNvCxnSpPr>
+          <p:nvPr/>
+        </p:nvCxnSpPr>
+        <p:spPr>
+          <a:xfrm>
+            <a:off x="3165896" y="3525766"/>
+            <a:ext cx="284122" cy="4127"/>
+          </a:xfrm>
+          <a:prstGeom prst="line">
+            <a:avLst/>
+          </a:prstGeom>
+          <a:ln w="19050">
+            <a:solidFill>
+              <a:schemeClr val="tx1"/>
+            </a:solidFill>
+            <a:tailEnd type="triangle"/>
+          </a:ln>
+        </p:spPr>
+        <p:style>
+          <a:lnRef idx="1">
+            <a:schemeClr val="accent1"/>
+          </a:lnRef>
+          <a:fillRef idx="0">
+            <a:schemeClr val="accent1"/>
+          </a:fillRef>
+          <a:effectRef idx="0">
+            <a:schemeClr val="accent1"/>
+          </a:effectRef>
+          <a:fontRef idx="minor">
+            <a:schemeClr val="tx1"/>
+          </a:fontRef>
+        </p:style>
+      </p:cxnSp>
+      <p:cxnSp>
+        <p:nvCxnSpPr>
+          <p:cNvPr id="28" name="직선 연결선 27"/>
+          <p:cNvCxnSpPr>
+            <a:endCxn id="22" idx="2"/>
+          </p:cNvCxnSpPr>
+          <p:nvPr/>
+        </p:nvCxnSpPr>
+        <p:spPr>
+          <a:xfrm flipV="1">
+            <a:off x="3450018" y="3527884"/>
+            <a:ext cx="189270" cy="6136"/>
+          </a:xfrm>
+          <a:prstGeom prst="line">
+            <a:avLst/>
+          </a:prstGeom>
+          <a:ln w="19050">
+            <a:solidFill>
+              <a:schemeClr val="tx1"/>
+            </a:solidFill>
+            <a:headEnd type="oval" w="med" len="med"/>
+            <a:tailEnd type="none" w="med" len="med"/>
+          </a:ln>
+        </p:spPr>
+        <p:style>
+          <a:lnRef idx="1">
+            <a:schemeClr val="accent1"/>
+          </a:lnRef>
+          <a:fillRef idx="0">
+            <a:schemeClr val="accent1"/>
+          </a:fillRef>
+          <a:effectRef idx="0">
+            <a:schemeClr val="accent1"/>
+          </a:effectRef>
+          <a:fontRef idx="minor">
+            <a:schemeClr val="tx1"/>
+          </a:fontRef>
+        </p:style>
+      </p:cxnSp>
+      <p:sp>
+        <p:nvSpPr>
+          <p:cNvPr id="29" name="TextBox 28"/>
+          <p:cNvSpPr txBox="1"/>
+          <p:nvPr/>
+        </p:nvSpPr>
+        <p:spPr>
+          <a:xfrm>
+            <a:off x="3012548" y="2843808"/>
+            <a:ext cx="745717" cy="600164"/>
+          </a:xfrm>
+          <a:prstGeom prst="rect">
+            <a:avLst/>
+          </a:prstGeom>
+          <a:noFill/>
+        </p:spPr>
+        <p:txBody>
+          <a:bodyPr wrap="none" rtlCol="0">
+            <a:spAutoFit/>
+          </a:bodyPr>
+          <a:lstStyle/>
+          <a:p>
+            <a:pPr algn="ctr"/>
+            <a:r>
+              <a:rPr lang="en-US" altLang="ko-KR" sz="1100" dirty="0" smtClean="0"/>
+              <a:t>Auction</a:t>
+            </a:r>
+          </a:p>
+          <a:p>
+            <a:pPr algn="ctr"/>
+            <a:r>
+              <a:rPr lang="en-US" altLang="ko-KR" sz="1100" dirty="0" smtClean="0"/>
+              <a:t>Message</a:t>
+            </a:r>
+          </a:p>
+          <a:p>
+            <a:pPr algn="ctr"/>
+            <a:r>
+              <a:rPr lang="en-US" altLang="ko-KR" sz="1100" dirty="0" smtClean="0"/>
+              <a:t>Listener</a:t>
+            </a:r>
+            <a:endParaRPr lang="ko-KR" altLang="en-US" sz="1100" dirty="0"/>
+          </a:p>
+        </p:txBody>
+      </p:sp>
+      <p:cxnSp>
+        <p:nvCxnSpPr>
+          <p:cNvPr id="30" name="직선 연결선 29"/>
+          <p:cNvCxnSpPr>
+            <a:stCxn id="22" idx="6"/>
+          </p:cNvCxnSpPr>
+          <p:nvPr/>
+        </p:nvCxnSpPr>
+        <p:spPr>
+          <a:xfrm>
+            <a:off x="5017543" y="3527884"/>
+            <a:ext cx="300316" cy="6136"/>
+          </a:xfrm>
+          <a:prstGeom prst="line">
+            <a:avLst/>
+          </a:prstGeom>
+          <a:ln w="19050">
+            <a:solidFill>
+              <a:schemeClr val="tx1"/>
+            </a:solidFill>
+            <a:tailEnd type="triangle"/>
+          </a:ln>
+        </p:spPr>
+        <p:style>
+          <a:lnRef idx="1">
+            <a:schemeClr val="accent1"/>
+          </a:lnRef>
+          <a:fillRef idx="0">
+            <a:schemeClr val="accent1"/>
+          </a:fillRef>
+          <a:effectRef idx="0">
+            <a:schemeClr val="accent1"/>
+          </a:effectRef>
+          <a:fontRef idx="minor">
+            <a:schemeClr val="tx1"/>
+          </a:fontRef>
+        </p:style>
+      </p:cxnSp>
+      <p:sp>
+        <p:nvSpPr>
+          <p:cNvPr id="32" name="TextBox 31"/>
+          <p:cNvSpPr txBox="1"/>
+          <p:nvPr/>
+        </p:nvSpPr>
+        <p:spPr>
+          <a:xfrm>
+            <a:off x="4910393" y="2891716"/>
+            <a:ext cx="678391" cy="600164"/>
+          </a:xfrm>
+          <a:prstGeom prst="rect">
+            <a:avLst/>
+          </a:prstGeom>
+          <a:noFill/>
+        </p:spPr>
+        <p:txBody>
+          <a:bodyPr wrap="none" rtlCol="0">
+            <a:spAutoFit/>
+          </a:bodyPr>
+          <a:lstStyle/>
+          <a:p>
+            <a:pPr algn="ctr"/>
+            <a:r>
+              <a:rPr lang="en-US" altLang="ko-KR" sz="1100" dirty="0" smtClean="0"/>
+              <a:t>Sniper</a:t>
+            </a:r>
+          </a:p>
+          <a:p>
+            <a:pPr algn="ctr"/>
+            <a:r>
+              <a:rPr lang="en-US" altLang="ko-KR" sz="1100" dirty="0" smtClean="0"/>
+              <a:t>Status</a:t>
+            </a:r>
+          </a:p>
+          <a:p>
+            <a:pPr algn="ctr"/>
+            <a:r>
+              <a:rPr lang="en-US" altLang="ko-KR" sz="1100" dirty="0" smtClean="0"/>
+              <a:t>Listener</a:t>
+            </a:r>
+            <a:endParaRPr lang="ko-KR" altLang="en-US" sz="1100" dirty="0"/>
+          </a:p>
+        </p:txBody>
+      </p:sp>
+      <p:cxnSp>
+        <p:nvCxnSpPr>
+          <p:cNvPr id="34" name="구부러진 연결선 33"/>
+          <p:cNvCxnSpPr>
+            <a:stCxn id="22" idx="4"/>
+          </p:cNvCxnSpPr>
+          <p:nvPr/>
+        </p:nvCxnSpPr>
+        <p:spPr>
+          <a:xfrm rot="5400000">
+            <a:off x="3695820" y="3867396"/>
+            <a:ext cx="576064" cy="689128"/>
+          </a:xfrm>
+          <a:prstGeom prst="curvedConnector2">
+            <a:avLst/>
+          </a:prstGeom>
+          <a:ln>
+            <a:solidFill>
+              <a:schemeClr val="tx1"/>
+            </a:solidFill>
+            <a:headEnd type="none" w="med" len="med"/>
+            <a:tailEnd type="triangle" w="med" len="med"/>
+          </a:ln>
+        </p:spPr>
+        <p:style>
+          <a:lnRef idx="1">
+            <a:schemeClr val="accent1"/>
+          </a:lnRef>
+          <a:fillRef idx="0">
+            <a:schemeClr val="accent1"/>
+          </a:fillRef>
+          <a:effectRef idx="0">
+            <a:schemeClr val="accent1"/>
+          </a:effectRef>
+          <a:fontRef idx="minor">
+            <a:schemeClr val="tx1"/>
+          </a:fontRef>
+        </p:style>
+      </p:cxnSp>
+      <p:sp>
+        <p:nvSpPr>
+          <p:cNvPr id="37" name="타원 36"/>
+          <p:cNvSpPr/>
+          <p:nvPr/>
+        </p:nvSpPr>
+        <p:spPr>
+          <a:xfrm>
+            <a:off x="1787641" y="4139952"/>
+            <a:ext cx="1378255" cy="792088"/>
+          </a:xfrm>
+          <a:prstGeom prst="ellipse">
+            <a:avLst/>
+          </a:prstGeom>
+          <a:noFill/>
+          <a:ln>
+            <a:solidFill>
+              <a:schemeClr val="tx1"/>
+            </a:solidFill>
+          </a:ln>
+        </p:spPr>
+        <p:style>
+          <a:lnRef idx="2">
+            <a:schemeClr val="accent1">
+              <a:shade val="50000"/>
+            </a:schemeClr>
+          </a:lnRef>
+          <a:fillRef idx="1">
+            <a:schemeClr val="accent1"/>
+          </a:fillRef>
+          <a:effectRef idx="0">
+            <a:schemeClr val="accent1"/>
+          </a:effectRef>
+          <a:fontRef idx="minor">
+            <a:schemeClr val="lt1"/>
+          </a:fontRef>
+        </p:style>
+        <p:txBody>
+          <a:bodyPr rtlCol="0" anchor="ctr"/>
+          <a:lstStyle/>
+          <a:p>
+            <a:pPr algn="ctr"/>
+            <a:r>
+              <a:rPr lang="en-US" altLang="ko-KR" sz="1200" b="1" dirty="0" smtClean="0">
+                <a:solidFill>
+                  <a:schemeClr val="tx1"/>
+                </a:solidFill>
+              </a:rPr>
+              <a:t>Auction</a:t>
+            </a:r>
+          </a:p>
+          <a:p>
+            <a:pPr algn="ctr"/>
+            <a:r>
+              <a:rPr lang="en-US" altLang="ko-KR" sz="1200" b="1" dirty="0" smtClean="0">
+                <a:solidFill>
+                  <a:schemeClr val="tx1"/>
+                </a:solidFill>
+              </a:rPr>
+              <a:t>Network</a:t>
+            </a:r>
+          </a:p>
+          <a:p>
+            <a:pPr algn="ctr"/>
+            <a:r>
+              <a:rPr lang="en-US" altLang="ko-KR" sz="1200" b="1" dirty="0" smtClean="0">
+                <a:solidFill>
+                  <a:schemeClr val="tx1"/>
+                </a:solidFill>
+              </a:rPr>
+              <a:t>Manager</a:t>
+            </a:r>
+            <a:endParaRPr lang="ko-KR" altLang="en-US" sz="1200" b="1" dirty="0">
+              <a:solidFill>
+                <a:schemeClr val="tx1"/>
+              </a:solidFill>
+            </a:endParaRPr>
+          </a:p>
+        </p:txBody>
+      </p:sp>
+      <p:cxnSp>
+        <p:nvCxnSpPr>
+          <p:cNvPr id="48" name="직선 연결선 47"/>
+          <p:cNvCxnSpPr>
+            <a:stCxn id="37" idx="6"/>
+          </p:cNvCxnSpPr>
+          <p:nvPr/>
+        </p:nvCxnSpPr>
+        <p:spPr>
+          <a:xfrm flipV="1">
+            <a:off x="3165896" y="4503420"/>
+            <a:ext cx="447889" cy="32576"/>
+          </a:xfrm>
+          <a:prstGeom prst="line">
+            <a:avLst/>
+          </a:prstGeom>
+          <a:ln>
+            <a:solidFill>
+              <a:schemeClr val="tx1"/>
+            </a:solidFill>
+            <a:headEnd type="none"/>
+            <a:tailEnd type="oval"/>
+          </a:ln>
+        </p:spPr>
+        <p:style>
+          <a:lnRef idx="1">
+            <a:schemeClr val="accent1"/>
+          </a:lnRef>
+          <a:fillRef idx="0">
+            <a:schemeClr val="accent1"/>
+          </a:fillRef>
+          <a:effectRef idx="0">
+            <a:schemeClr val="accent1"/>
+          </a:effectRef>
+          <a:fontRef idx="minor">
+            <a:schemeClr val="tx1"/>
+          </a:fontRef>
+        </p:style>
+      </p:cxnSp>
+      <p:cxnSp>
+        <p:nvCxnSpPr>
+          <p:cNvPr id="58" name="직선 연결선 57"/>
+          <p:cNvCxnSpPr>
+            <a:endCxn id="23" idx="2"/>
+          </p:cNvCxnSpPr>
+          <p:nvPr/>
+        </p:nvCxnSpPr>
+        <p:spPr>
+          <a:xfrm flipV="1">
+            <a:off x="5328920" y="3525766"/>
+            <a:ext cx="178209" cy="9914"/>
+          </a:xfrm>
+          <a:prstGeom prst="line">
+            <a:avLst/>
+          </a:prstGeom>
+          <a:ln w="19050">
+            <a:solidFill>
+              <a:schemeClr val="tx1"/>
+            </a:solidFill>
+            <a:headEnd type="oval" w="med" len="med"/>
+            <a:tailEnd type="none" w="med" len="med"/>
+          </a:ln>
+        </p:spPr>
+        <p:style>
+          <a:lnRef idx="1">
+            <a:schemeClr val="accent1"/>
+          </a:lnRef>
+          <a:fillRef idx="0">
+            <a:schemeClr val="accent1"/>
+          </a:fillRef>
+          <a:effectRef idx="0">
+            <a:schemeClr val="accent1"/>
+          </a:effectRef>
+          <a:fontRef idx="minor">
+            <a:schemeClr val="tx1"/>
+          </a:fontRef>
+        </p:style>
+      </p:cxnSp>
+    </p:spTree>
+    <p:extLst>
+      <p:ext uri="{BB962C8B-B14F-4D97-AF65-F5344CB8AC3E}">
+        <p14:creationId xmlns:p14="http://schemas.microsoft.com/office/powerpoint/2010/main" val="2023827302"/>
       </p:ext>
     </p:extLst>
   </p:cSld>

</xml_diff>